<commit_message>
Added names to the poster
</commit_message>
<xml_diff>
--- a/Poster_v1.pptx
+++ b/Poster_v1.pptx
@@ -1400,7 +1400,7 @@
           <a:p>
             <a:fld id="{5DBC0D4A-1832-45ED-ACA3-13DB8BB18BE4}" type="datetimeFigureOut">
               <a:rPr lang="en-AT" smtClean="0"/>
-              <a:t>30/10/2025</a:t>
+              <a:t>01/11/2025</a:t>
             </a:fld>
             <a:endParaRPr lang="en-AT"/>
           </a:p>
@@ -1991,7 +1991,7 @@
           <a:p>
             <a:fld id="{688BFBE3-E0D3-4C95-B731-1AA5885DBB2E}" type="datetimeFigureOut">
               <a:rPr lang="en-AT" smtClean="0"/>
-              <a:t>30/10/2025</a:t>
+              <a:t>01/11/2025</a:t>
             </a:fld>
             <a:endParaRPr lang="en-AT"/>
           </a:p>
@@ -2161,7 +2161,7 @@
           <a:p>
             <a:fld id="{688BFBE3-E0D3-4C95-B731-1AA5885DBB2E}" type="datetimeFigureOut">
               <a:rPr lang="en-AT" smtClean="0"/>
-              <a:t>30/10/2025</a:t>
+              <a:t>01/11/2025</a:t>
             </a:fld>
             <a:endParaRPr lang="en-AT"/>
           </a:p>
@@ -2341,7 +2341,7 @@
           <a:p>
             <a:fld id="{688BFBE3-E0D3-4C95-B731-1AA5885DBB2E}" type="datetimeFigureOut">
               <a:rPr lang="en-AT" smtClean="0"/>
-              <a:t>30/10/2025</a:t>
+              <a:t>01/11/2025</a:t>
             </a:fld>
             <a:endParaRPr lang="en-AT"/>
           </a:p>
@@ -2732,7 +2732,7 @@
           <a:p>
             <a:fld id="{688BFBE3-E0D3-4C95-B731-1AA5885DBB2E}" type="datetimeFigureOut">
               <a:rPr lang="en-AT" smtClean="0"/>
-              <a:t>30/10/2025</a:t>
+              <a:t>01/11/2025</a:t>
             </a:fld>
             <a:endParaRPr lang="en-AT"/>
           </a:p>
@@ -2964,7 +2964,7 @@
           <a:p>
             <a:fld id="{688BFBE3-E0D3-4C95-B731-1AA5885DBB2E}" type="datetimeFigureOut">
               <a:rPr lang="en-AT" smtClean="0"/>
-              <a:t>30/10/2025</a:t>
+              <a:t>01/11/2025</a:t>
             </a:fld>
             <a:endParaRPr lang="en-AT"/>
           </a:p>
@@ -3331,7 +3331,7 @@
           <a:p>
             <a:fld id="{688BFBE3-E0D3-4C95-B731-1AA5885DBB2E}" type="datetimeFigureOut">
               <a:rPr lang="en-AT" smtClean="0"/>
-              <a:t>30/10/2025</a:t>
+              <a:t>01/11/2025</a:t>
             </a:fld>
             <a:endParaRPr lang="en-AT"/>
           </a:p>
@@ -3449,7 +3449,7 @@
           <a:p>
             <a:fld id="{688BFBE3-E0D3-4C95-B731-1AA5885DBB2E}" type="datetimeFigureOut">
               <a:rPr lang="en-AT" smtClean="0"/>
-              <a:t>30/10/2025</a:t>
+              <a:t>01/11/2025</a:t>
             </a:fld>
             <a:endParaRPr lang="en-AT"/>
           </a:p>
@@ -3544,7 +3544,7 @@
           <a:p>
             <a:fld id="{688BFBE3-E0D3-4C95-B731-1AA5885DBB2E}" type="datetimeFigureOut">
               <a:rPr lang="en-AT" smtClean="0"/>
-              <a:t>30/10/2025</a:t>
+              <a:t>01/11/2025</a:t>
             </a:fld>
             <a:endParaRPr lang="en-AT"/>
           </a:p>
@@ -3821,7 +3821,7 @@
           <a:p>
             <a:fld id="{688BFBE3-E0D3-4C95-B731-1AA5885DBB2E}" type="datetimeFigureOut">
               <a:rPr lang="en-AT" smtClean="0"/>
-              <a:t>30/10/2025</a:t>
+              <a:t>01/11/2025</a:t>
             </a:fld>
             <a:endParaRPr lang="en-AT"/>
           </a:p>
@@ -4078,7 +4078,7 @@
           <a:p>
             <a:fld id="{688BFBE3-E0D3-4C95-B731-1AA5885DBB2E}" type="datetimeFigureOut">
               <a:rPr lang="en-AT" smtClean="0"/>
-              <a:t>30/10/2025</a:t>
+              <a:t>01/11/2025</a:t>
             </a:fld>
             <a:endParaRPr lang="en-AT"/>
           </a:p>
@@ -4291,7 +4291,7 @@
           <a:p>
             <a:fld id="{688BFBE3-E0D3-4C95-B731-1AA5885DBB2E}" type="datetimeFigureOut">
               <a:rPr lang="en-AT" smtClean="0"/>
-              <a:t>30/10/2025</a:t>
+              <a:t>01/11/2025</a:t>
             </a:fld>
             <a:endParaRPr lang="en-AT"/>
           </a:p>
@@ -5363,7 +5363,7 @@
                   <a:srgbClr val="444444"/>
                 </a:solidFill>
               </a:rPr>
-              <a:t>A Report by: First Last, First Last, First Last, First Last</a:t>
+              <a:t>Moritz Baldauf, Libero Biagi, Jenny Cubelo, Marcell Hajdú</a:t>
             </a:r>
             <a:endParaRPr lang="en-AT" sz="1400" dirty="0">
               <a:solidFill>
@@ -6145,9 +6145,7 @@
             <a:srgbClr val="CACCCC"/>
           </a:solidFill>
           <a:ln>
-            <a:solidFill>
-              <a:srgbClr val="444444"/>
-            </a:solidFill>
+            <a:noFill/>
           </a:ln>
         </p:spPr>
         <p:style>
@@ -8004,7 +8002,7 @@
 </file>
 
 <file path=ppt/slides/slide3.xml><?xml version="1.0" encoding="utf-8"?>
-<p:sld xmlns:a="http://schemas.openxmlformats.org/drawingml/2006/main" xmlns:r="http://schemas.openxmlformats.org/officeDocument/2006/relationships" xmlns:p="http://schemas.openxmlformats.org/presentationml/2006/main">
+<p:sld xmlns:a="http://schemas.openxmlformats.org/drawingml/2006/main" xmlns:r="http://schemas.openxmlformats.org/officeDocument/2006/relationships" xmlns:p="http://schemas.openxmlformats.org/presentationml/2006/main" show="0">
   <p:cSld>
     <p:spTree>
       <p:nvGrpSpPr>
@@ -8111,50 +8109,6 @@
               <a:t>Amazing Airlines Customer Analysis</a:t>
             </a:r>
             <a:endParaRPr lang="en-AT" sz="4000" b="1" dirty="0"/>
-          </a:p>
-        </p:txBody>
-      </p:sp>
-      <p:sp>
-        <p:nvSpPr>
-          <p:cNvPr id="28" name="TextBox 27">
-            <a:extLst>
-              <a:ext uri="{FF2B5EF4-FFF2-40B4-BE49-F238E27FC236}">
-                <a16:creationId xmlns:a16="http://schemas.microsoft.com/office/drawing/2014/main" id="{81006B98-3E1B-0B2F-87E7-22C1D44CFEA7}"/>
-              </a:ext>
-            </a:extLst>
-          </p:cNvPr>
-          <p:cNvSpPr txBox="1"/>
-          <p:nvPr/>
-        </p:nvSpPr>
-        <p:spPr>
-          <a:xfrm>
-            <a:off x="2487930" y="1009650"/>
-            <a:ext cx="4625340" cy="307777"/>
-          </a:xfrm>
-          <a:prstGeom prst="rect">
-            <a:avLst/>
-          </a:prstGeom>
-          <a:noFill/>
-        </p:spPr>
-        <p:txBody>
-          <a:bodyPr wrap="square" rtlCol="0">
-            <a:spAutoFit/>
-          </a:bodyPr>
-          <a:lstStyle/>
-          <a:p>
-            <a:r>
-              <a:rPr lang="en-GB" sz="1400" dirty="0">
-                <a:solidFill>
-                  <a:srgbClr val="444444"/>
-                </a:solidFill>
-              </a:rPr>
-              <a:t>A Report by: First Last, First Last, First Last, First Last</a:t>
-            </a:r>
-            <a:endParaRPr lang="en-AT" sz="1400" dirty="0">
-              <a:solidFill>
-                <a:srgbClr val="444444"/>
-              </a:solidFill>
-            </a:endParaRPr>
           </a:p>
         </p:txBody>
       </p:sp>
@@ -10980,6 +10934,50 @@
             </a:r>
             <a:endParaRPr lang="en-AT" dirty="0">
               <a:effectLst/>
+            </a:endParaRPr>
+          </a:p>
+        </p:txBody>
+      </p:sp>
+      <p:sp>
+        <p:nvSpPr>
+          <p:cNvPr id="2" name="TextBox 1">
+            <a:extLst>
+              <a:ext uri="{FF2B5EF4-FFF2-40B4-BE49-F238E27FC236}">
+                <a16:creationId xmlns:a16="http://schemas.microsoft.com/office/drawing/2014/main" id="{CD9FC181-1926-F243-E3C2-34552C56520B}"/>
+              </a:ext>
+            </a:extLst>
+          </p:cNvPr>
+          <p:cNvSpPr txBox="1"/>
+          <p:nvPr/>
+        </p:nvSpPr>
+        <p:spPr>
+          <a:xfrm>
+            <a:off x="2487930" y="1009650"/>
+            <a:ext cx="4625340" cy="307777"/>
+          </a:xfrm>
+          <a:prstGeom prst="rect">
+            <a:avLst/>
+          </a:prstGeom>
+          <a:noFill/>
+        </p:spPr>
+        <p:txBody>
+          <a:bodyPr wrap="square" rtlCol="0">
+            <a:spAutoFit/>
+          </a:bodyPr>
+          <a:lstStyle/>
+          <a:p>
+            <a:r>
+              <a:rPr lang="en-GB" sz="1400" dirty="0">
+                <a:solidFill>
+                  <a:srgbClr val="444444"/>
+                </a:solidFill>
+              </a:rPr>
+              <a:t>Moritz Baldauf, Libero Biagi, Jenny Cubelo, Marcell Hajdú</a:t>
+            </a:r>
+            <a:endParaRPr lang="en-AT" sz="1400" dirty="0">
+              <a:solidFill>
+                <a:srgbClr val="444444"/>
+              </a:solidFill>
             </a:endParaRPr>
           </a:p>
         </p:txBody>

</xml_diff>

<commit_message>
Finished poster and added open todos to the File. All open things are marked with TODO to  find them quickly
</commit_message>
<xml_diff>
--- a/Poster_v1.pptx
+++ b/Poster_v1.pptx
@@ -5,12 +5,10 @@
     <p:sldMasterId id="2147483660" r:id="rId1"/>
   </p:sldMasterIdLst>
   <p:notesMasterIdLst>
-    <p:notesMasterId r:id="rId5"/>
+    <p:notesMasterId r:id="rId3"/>
   </p:notesMasterIdLst>
   <p:sldIdLst>
-    <p:sldId id="257" r:id="rId2"/>
-    <p:sldId id="260" r:id="rId3"/>
-    <p:sldId id="261" r:id="rId4"/>
+    <p:sldId id="260" r:id="rId2"/>
   </p:sldIdLst>
   <p:sldSz cx="9601200" cy="12801600" type="A3"/>
   <p:notesSz cx="6858000" cy="9144000"/>
@@ -1400,7 +1398,7 @@
           <a:p>
             <a:fld id="{5DBC0D4A-1832-45ED-ACA3-13DB8BB18BE4}" type="datetimeFigureOut">
               <a:rPr lang="en-AT" smtClean="0"/>
-              <a:t>01/11/2025</a:t>
+              <a:t>03/11/2025</a:t>
             </a:fld>
             <a:endParaRPr lang="en-AT"/>
           </a:p>
@@ -1733,7 +1731,7 @@
           <a:p>
             <a:fld id="{0EB68914-A27C-4535-8DDE-FFBAD91E2856}" type="slidenum">
               <a:rPr lang="en-AT" smtClean="0"/>
-              <a:t>2</a:t>
+              <a:t>1</a:t>
             </a:fld>
             <a:endParaRPr lang="en-AT"/>
           </a:p>
@@ -1743,114 +1741,6 @@
     <p:extLst>
       <p:ext uri="{BB962C8B-B14F-4D97-AF65-F5344CB8AC3E}">
         <p14:creationId xmlns:p14="http://schemas.microsoft.com/office/powerpoint/2010/main" val="2519311774"/>
-      </p:ext>
-    </p:extLst>
-  </p:cSld>
-  <p:clrMapOvr>
-    <a:masterClrMapping/>
-  </p:clrMapOvr>
-</p:notes>
-</file>
-
-<file path=ppt/notesSlides/notesSlide2.xml><?xml version="1.0" encoding="utf-8"?>
-<p:notes xmlns:a="http://schemas.openxmlformats.org/drawingml/2006/main" xmlns:r="http://schemas.openxmlformats.org/officeDocument/2006/relationships" xmlns:p="http://schemas.openxmlformats.org/presentationml/2006/main">
-  <p:cSld>
-    <p:spTree>
-      <p:nvGrpSpPr>
-        <p:cNvPr id="1" name="">
-          <a:extLst>
-            <a:ext uri="{FF2B5EF4-FFF2-40B4-BE49-F238E27FC236}">
-              <a16:creationId xmlns:a16="http://schemas.microsoft.com/office/drawing/2014/main" id="{0D214ABD-73E8-4F4F-8490-BC6EB7CEA4F3}"/>
-            </a:ext>
-          </a:extLst>
-        </p:cNvPr>
-        <p:cNvGrpSpPr/>
-        <p:nvPr/>
-      </p:nvGrpSpPr>
-      <p:grpSpPr>
-        <a:xfrm>
-          <a:off x="0" y="0"/>
-          <a:ext cx="0" cy="0"/>
-          <a:chOff x="0" y="0"/>
-          <a:chExt cx="0" cy="0"/>
-        </a:xfrm>
-      </p:grpSpPr>
-      <p:sp>
-        <p:nvSpPr>
-          <p:cNvPr id="2" name="Slide Image Placeholder 1">
-            <a:extLst>
-              <a:ext uri="{FF2B5EF4-FFF2-40B4-BE49-F238E27FC236}">
-                <a16:creationId xmlns:a16="http://schemas.microsoft.com/office/drawing/2014/main" id="{15B4A771-9E91-57FA-05DC-BF86A4D1DD26}"/>
-              </a:ext>
-            </a:extLst>
-          </p:cNvPr>
-          <p:cNvSpPr>
-            <a:spLocks noGrp="1" noRot="1" noChangeAspect="1"/>
-          </p:cNvSpPr>
-          <p:nvPr>
-            <p:ph type="sldImg"/>
-          </p:nvPr>
-        </p:nvSpPr>
-        <p:spPr/>
-      </p:sp>
-      <p:sp>
-        <p:nvSpPr>
-          <p:cNvPr id="3" name="Notes Placeholder 2">
-            <a:extLst>
-              <a:ext uri="{FF2B5EF4-FFF2-40B4-BE49-F238E27FC236}">
-                <a16:creationId xmlns:a16="http://schemas.microsoft.com/office/drawing/2014/main" id="{4F8EA0F3-CDC3-7459-7A15-02F15D6AF8E0}"/>
-              </a:ext>
-            </a:extLst>
-          </p:cNvPr>
-          <p:cNvSpPr>
-            <a:spLocks noGrp="1"/>
-          </p:cNvSpPr>
-          <p:nvPr>
-            <p:ph type="body" idx="1"/>
-          </p:nvPr>
-        </p:nvSpPr>
-        <p:spPr/>
-        <p:txBody>
-          <a:bodyPr/>
-          <a:lstStyle/>
-          <a:p>
-            <a:endParaRPr lang="en-AT" dirty="0"/>
-          </a:p>
-        </p:txBody>
-      </p:sp>
-      <p:sp>
-        <p:nvSpPr>
-          <p:cNvPr id="4" name="Slide Number Placeholder 3">
-            <a:extLst>
-              <a:ext uri="{FF2B5EF4-FFF2-40B4-BE49-F238E27FC236}">
-                <a16:creationId xmlns:a16="http://schemas.microsoft.com/office/drawing/2014/main" id="{37461271-9676-4E26-6D5D-F550E2F7E960}"/>
-              </a:ext>
-            </a:extLst>
-          </p:cNvPr>
-          <p:cNvSpPr>
-            <a:spLocks noGrp="1"/>
-          </p:cNvSpPr>
-          <p:nvPr>
-            <p:ph type="sldNum" sz="quarter" idx="5"/>
-          </p:nvPr>
-        </p:nvSpPr>
-        <p:spPr/>
-        <p:txBody>
-          <a:bodyPr/>
-          <a:lstStyle/>
-          <a:p>
-            <a:fld id="{0EB68914-A27C-4535-8DDE-FFBAD91E2856}" type="slidenum">
-              <a:rPr lang="en-AT" smtClean="0"/>
-              <a:t>3</a:t>
-            </a:fld>
-            <a:endParaRPr lang="en-AT"/>
-          </a:p>
-        </p:txBody>
-      </p:sp>
-    </p:spTree>
-    <p:extLst>
-      <p:ext uri="{BB962C8B-B14F-4D97-AF65-F5344CB8AC3E}">
-        <p14:creationId xmlns:p14="http://schemas.microsoft.com/office/powerpoint/2010/main" val="3308657099"/>
       </p:ext>
     </p:extLst>
   </p:cSld>
@@ -1991,7 +1881,7 @@
           <a:p>
             <a:fld id="{688BFBE3-E0D3-4C95-B731-1AA5885DBB2E}" type="datetimeFigureOut">
               <a:rPr lang="en-AT" smtClean="0"/>
-              <a:t>01/11/2025</a:t>
+              <a:t>03/11/2025</a:t>
             </a:fld>
             <a:endParaRPr lang="en-AT"/>
           </a:p>
@@ -2161,7 +2051,7 @@
           <a:p>
             <a:fld id="{688BFBE3-E0D3-4C95-B731-1AA5885DBB2E}" type="datetimeFigureOut">
               <a:rPr lang="en-AT" smtClean="0"/>
-              <a:t>01/11/2025</a:t>
+              <a:t>03/11/2025</a:t>
             </a:fld>
             <a:endParaRPr lang="en-AT"/>
           </a:p>
@@ -2341,7 +2231,7 @@
           <a:p>
             <a:fld id="{688BFBE3-E0D3-4C95-B731-1AA5885DBB2E}" type="datetimeFigureOut">
               <a:rPr lang="en-AT" smtClean="0"/>
-              <a:t>01/11/2025</a:t>
+              <a:t>03/11/2025</a:t>
             </a:fld>
             <a:endParaRPr lang="en-AT"/>
           </a:p>
@@ -2732,7 +2622,7 @@
           <a:p>
             <a:fld id="{688BFBE3-E0D3-4C95-B731-1AA5885DBB2E}" type="datetimeFigureOut">
               <a:rPr lang="en-AT" smtClean="0"/>
-              <a:t>01/11/2025</a:t>
+              <a:t>03/11/2025</a:t>
             </a:fld>
             <a:endParaRPr lang="en-AT"/>
           </a:p>
@@ -2964,7 +2854,7 @@
           <a:p>
             <a:fld id="{688BFBE3-E0D3-4C95-B731-1AA5885DBB2E}" type="datetimeFigureOut">
               <a:rPr lang="en-AT" smtClean="0"/>
-              <a:t>01/11/2025</a:t>
+              <a:t>03/11/2025</a:t>
             </a:fld>
             <a:endParaRPr lang="en-AT"/>
           </a:p>
@@ -3331,7 +3221,7 @@
           <a:p>
             <a:fld id="{688BFBE3-E0D3-4C95-B731-1AA5885DBB2E}" type="datetimeFigureOut">
               <a:rPr lang="en-AT" smtClean="0"/>
-              <a:t>01/11/2025</a:t>
+              <a:t>03/11/2025</a:t>
             </a:fld>
             <a:endParaRPr lang="en-AT"/>
           </a:p>
@@ -3449,7 +3339,7 @@
           <a:p>
             <a:fld id="{688BFBE3-E0D3-4C95-B731-1AA5885DBB2E}" type="datetimeFigureOut">
               <a:rPr lang="en-AT" smtClean="0"/>
-              <a:t>01/11/2025</a:t>
+              <a:t>03/11/2025</a:t>
             </a:fld>
             <a:endParaRPr lang="en-AT"/>
           </a:p>
@@ -3544,7 +3434,7 @@
           <a:p>
             <a:fld id="{688BFBE3-E0D3-4C95-B731-1AA5885DBB2E}" type="datetimeFigureOut">
               <a:rPr lang="en-AT" smtClean="0"/>
-              <a:t>01/11/2025</a:t>
+              <a:t>03/11/2025</a:t>
             </a:fld>
             <a:endParaRPr lang="en-AT"/>
           </a:p>
@@ -3821,7 +3711,7 @@
           <a:p>
             <a:fld id="{688BFBE3-E0D3-4C95-B731-1AA5885DBB2E}" type="datetimeFigureOut">
               <a:rPr lang="en-AT" smtClean="0"/>
-              <a:t>01/11/2025</a:t>
+              <a:t>03/11/2025</a:t>
             </a:fld>
             <a:endParaRPr lang="en-AT"/>
           </a:p>
@@ -4078,7 +3968,7 @@
           <a:p>
             <a:fld id="{688BFBE3-E0D3-4C95-B731-1AA5885DBB2E}" type="datetimeFigureOut">
               <a:rPr lang="en-AT" smtClean="0"/>
-              <a:t>01/11/2025</a:t>
+              <a:t>03/11/2025</a:t>
             </a:fld>
             <a:endParaRPr lang="en-AT"/>
           </a:p>
@@ -4291,7 +4181,7 @@
           <a:p>
             <a:fld id="{688BFBE3-E0D3-4C95-B731-1AA5885DBB2E}" type="datetimeFigureOut">
               <a:rPr lang="en-AT" smtClean="0"/>
-              <a:t>01/11/2025</a:t>
+              <a:t>03/11/2025</a:t>
             </a:fld>
             <a:endParaRPr lang="en-AT"/>
           </a:p>
@@ -4680,417 +4570,6 @@
 </file>
 
 <file path=ppt/slides/slide1.xml><?xml version="1.0" encoding="utf-8"?>
-<p:sld xmlns:a="http://schemas.openxmlformats.org/drawingml/2006/main" xmlns:r="http://schemas.openxmlformats.org/officeDocument/2006/relationships" xmlns:p="http://schemas.openxmlformats.org/presentationml/2006/main" show="0">
-  <p:cSld>
-    <p:spTree>
-      <p:nvGrpSpPr>
-        <p:cNvPr id="1" name=""/>
-        <p:cNvGrpSpPr/>
-        <p:nvPr/>
-      </p:nvGrpSpPr>
-      <p:grpSpPr>
-        <a:xfrm>
-          <a:off x="0" y="0"/>
-          <a:ext cx="0" cy="0"/>
-          <a:chOff x="0" y="0"/>
-          <a:chExt cx="0" cy="0"/>
-        </a:xfrm>
-      </p:grpSpPr>
-      <p:sp>
-        <p:nvSpPr>
-          <p:cNvPr id="2" name="Title 1">
-            <a:extLst>
-              <a:ext uri="{FF2B5EF4-FFF2-40B4-BE49-F238E27FC236}">
-                <a16:creationId xmlns:a16="http://schemas.microsoft.com/office/drawing/2014/main" id="{E3AFFA07-58F8-82C4-329D-C7F916674289}"/>
-              </a:ext>
-            </a:extLst>
-          </p:cNvPr>
-          <p:cNvSpPr>
-            <a:spLocks noGrp="1"/>
-          </p:cNvSpPr>
-          <p:nvPr>
-            <p:ph type="title"/>
-          </p:nvPr>
-        </p:nvSpPr>
-        <p:spPr/>
-        <p:txBody>
-          <a:bodyPr/>
-          <a:lstStyle/>
-          <a:p>
-            <a:r>
-              <a:rPr lang="en-GB" dirty="0"/>
-              <a:t>Formatting Etc slide</a:t>
-            </a:r>
-            <a:endParaRPr lang="en-AT" dirty="0"/>
-          </a:p>
-        </p:txBody>
-      </p:sp>
-      <p:sp>
-        <p:nvSpPr>
-          <p:cNvPr id="4" name="Rectangle 3">
-            <a:extLst>
-              <a:ext uri="{FF2B5EF4-FFF2-40B4-BE49-F238E27FC236}">
-                <a16:creationId xmlns:a16="http://schemas.microsoft.com/office/drawing/2014/main" id="{DE422EEB-FDCB-95D2-DD09-D1AB67AB836A}"/>
-              </a:ext>
-            </a:extLst>
-          </p:cNvPr>
-          <p:cNvSpPr/>
-          <p:nvPr/>
-        </p:nvSpPr>
-        <p:spPr>
-          <a:xfrm>
-            <a:off x="1147482" y="3460376"/>
-            <a:ext cx="788894" cy="806824"/>
-          </a:xfrm>
-          <a:prstGeom prst="rect">
-            <a:avLst/>
-          </a:prstGeom>
-          <a:solidFill>
-            <a:srgbClr val="4CA1D6"/>
-          </a:solidFill>
-          <a:ln>
-            <a:noFill/>
-          </a:ln>
-        </p:spPr>
-        <p:style>
-          <a:lnRef idx="2">
-            <a:schemeClr val="accent1">
-              <a:shade val="15000"/>
-            </a:schemeClr>
-          </a:lnRef>
-          <a:fillRef idx="1">
-            <a:schemeClr val="accent1"/>
-          </a:fillRef>
-          <a:effectRef idx="0">
-            <a:schemeClr val="accent1"/>
-          </a:effectRef>
-          <a:fontRef idx="minor">
-            <a:schemeClr val="lt1"/>
-          </a:fontRef>
-        </p:style>
-        <p:txBody>
-          <a:bodyPr rtlCol="0" anchor="ctr"/>
-          <a:lstStyle/>
-          <a:p>
-            <a:pPr algn="ctr"/>
-            <a:endParaRPr lang="en-AT" dirty="0"/>
-          </a:p>
-        </p:txBody>
-      </p:sp>
-      <p:sp>
-        <p:nvSpPr>
-          <p:cNvPr id="7" name="Rectangle 6">
-            <a:extLst>
-              <a:ext uri="{FF2B5EF4-FFF2-40B4-BE49-F238E27FC236}">
-                <a16:creationId xmlns:a16="http://schemas.microsoft.com/office/drawing/2014/main" id="{1F7CA824-B7F5-A0CD-56EF-2BB8CD58D8F4}"/>
-              </a:ext>
-            </a:extLst>
-          </p:cNvPr>
-          <p:cNvSpPr/>
-          <p:nvPr/>
-        </p:nvSpPr>
-        <p:spPr>
-          <a:xfrm>
-            <a:off x="3260164" y="3460376"/>
-            <a:ext cx="788894" cy="806824"/>
-          </a:xfrm>
-          <a:prstGeom prst="rect">
-            <a:avLst/>
-          </a:prstGeom>
-          <a:solidFill>
-            <a:srgbClr val="001D43"/>
-          </a:solidFill>
-          <a:ln>
-            <a:noFill/>
-          </a:ln>
-        </p:spPr>
-        <p:style>
-          <a:lnRef idx="2">
-            <a:schemeClr val="accent1">
-              <a:shade val="15000"/>
-            </a:schemeClr>
-          </a:lnRef>
-          <a:fillRef idx="1">
-            <a:schemeClr val="accent1"/>
-          </a:fillRef>
-          <a:effectRef idx="0">
-            <a:schemeClr val="accent1"/>
-          </a:effectRef>
-          <a:fontRef idx="minor">
-            <a:schemeClr val="lt1"/>
-          </a:fontRef>
-        </p:style>
-        <p:txBody>
-          <a:bodyPr rtlCol="0" anchor="ctr"/>
-          <a:lstStyle/>
-          <a:p>
-            <a:pPr algn="ctr"/>
-            <a:endParaRPr lang="en-AT" dirty="0"/>
-          </a:p>
-        </p:txBody>
-      </p:sp>
-      <p:sp>
-        <p:nvSpPr>
-          <p:cNvPr id="8" name="Rectangle 7">
-            <a:extLst>
-              <a:ext uri="{FF2B5EF4-FFF2-40B4-BE49-F238E27FC236}">
-                <a16:creationId xmlns:a16="http://schemas.microsoft.com/office/drawing/2014/main" id="{71FE5979-17B6-81C7-8B6C-C31D18ADAB79}"/>
-              </a:ext>
-            </a:extLst>
-          </p:cNvPr>
-          <p:cNvSpPr/>
-          <p:nvPr/>
-        </p:nvSpPr>
-        <p:spPr>
-          <a:xfrm>
-            <a:off x="5372846" y="3460376"/>
-            <a:ext cx="788894" cy="806824"/>
-          </a:xfrm>
-          <a:prstGeom prst="rect">
-            <a:avLst/>
-          </a:prstGeom>
-          <a:solidFill>
-            <a:srgbClr val="CACCCC"/>
-          </a:solidFill>
-          <a:ln>
-            <a:noFill/>
-          </a:ln>
-        </p:spPr>
-        <p:style>
-          <a:lnRef idx="2">
-            <a:schemeClr val="accent1">
-              <a:shade val="15000"/>
-            </a:schemeClr>
-          </a:lnRef>
-          <a:fillRef idx="1">
-            <a:schemeClr val="accent1"/>
-          </a:fillRef>
-          <a:effectRef idx="0">
-            <a:schemeClr val="accent1"/>
-          </a:effectRef>
-          <a:fontRef idx="minor">
-            <a:schemeClr val="lt1"/>
-          </a:fontRef>
-        </p:style>
-        <p:txBody>
-          <a:bodyPr rtlCol="0" anchor="ctr"/>
-          <a:lstStyle/>
-          <a:p>
-            <a:pPr algn="ctr"/>
-            <a:endParaRPr lang="en-AT" dirty="0"/>
-          </a:p>
-        </p:txBody>
-      </p:sp>
-      <p:sp>
-        <p:nvSpPr>
-          <p:cNvPr id="9" name="Rectangle 8">
-            <a:extLst>
-              <a:ext uri="{FF2B5EF4-FFF2-40B4-BE49-F238E27FC236}">
-                <a16:creationId xmlns:a16="http://schemas.microsoft.com/office/drawing/2014/main" id="{E1950094-3DF0-55A0-D005-D121922150FD}"/>
-              </a:ext>
-            </a:extLst>
-          </p:cNvPr>
-          <p:cNvSpPr/>
-          <p:nvPr/>
-        </p:nvSpPr>
-        <p:spPr>
-          <a:xfrm>
-            <a:off x="7485529" y="3460376"/>
-            <a:ext cx="788894" cy="806824"/>
-          </a:xfrm>
-          <a:prstGeom prst="rect">
-            <a:avLst/>
-          </a:prstGeom>
-          <a:solidFill>
-            <a:srgbClr val="444444"/>
-          </a:solidFill>
-          <a:ln>
-            <a:noFill/>
-          </a:ln>
-        </p:spPr>
-        <p:style>
-          <a:lnRef idx="2">
-            <a:schemeClr val="accent1">
-              <a:shade val="15000"/>
-            </a:schemeClr>
-          </a:lnRef>
-          <a:fillRef idx="1">
-            <a:schemeClr val="accent1"/>
-          </a:fillRef>
-          <a:effectRef idx="0">
-            <a:schemeClr val="accent1"/>
-          </a:effectRef>
-          <a:fontRef idx="minor">
-            <a:schemeClr val="lt1"/>
-          </a:fontRef>
-        </p:style>
-        <p:txBody>
-          <a:bodyPr rtlCol="0" anchor="ctr"/>
-          <a:lstStyle/>
-          <a:p>
-            <a:pPr algn="ctr"/>
-            <a:endParaRPr lang="en-AT" dirty="0"/>
-          </a:p>
-        </p:txBody>
-      </p:sp>
-      <p:sp>
-        <p:nvSpPr>
-          <p:cNvPr id="3" name="TextBox 2">
-            <a:extLst>
-              <a:ext uri="{FF2B5EF4-FFF2-40B4-BE49-F238E27FC236}">
-                <a16:creationId xmlns:a16="http://schemas.microsoft.com/office/drawing/2014/main" id="{65652A05-E694-6F6F-5ECF-D1693944EAFA}"/>
-              </a:ext>
-            </a:extLst>
-          </p:cNvPr>
-          <p:cNvSpPr txBox="1"/>
-          <p:nvPr/>
-        </p:nvSpPr>
-        <p:spPr>
-          <a:xfrm>
-            <a:off x="1147482" y="4683967"/>
-            <a:ext cx="1427767" cy="369332"/>
-          </a:xfrm>
-          <a:prstGeom prst="rect">
-            <a:avLst/>
-          </a:prstGeom>
-          <a:noFill/>
-        </p:spPr>
-        <p:txBody>
-          <a:bodyPr wrap="square" rtlCol="0">
-            <a:spAutoFit/>
-          </a:bodyPr>
-          <a:lstStyle/>
-          <a:p>
-            <a:r>
-              <a:rPr lang="pt-PT" dirty="0"/>
-              <a:t>4ca1d6</a:t>
-            </a:r>
-            <a:endParaRPr lang="en-AT" dirty="0"/>
-          </a:p>
-        </p:txBody>
-      </p:sp>
-      <p:sp>
-        <p:nvSpPr>
-          <p:cNvPr id="5" name="TextBox 4">
-            <a:extLst>
-              <a:ext uri="{FF2B5EF4-FFF2-40B4-BE49-F238E27FC236}">
-                <a16:creationId xmlns:a16="http://schemas.microsoft.com/office/drawing/2014/main" id="{A61BF766-7951-65DB-EE57-EF14FCCD447C}"/>
-              </a:ext>
-            </a:extLst>
-          </p:cNvPr>
-          <p:cNvSpPr txBox="1"/>
-          <p:nvPr/>
-        </p:nvSpPr>
-        <p:spPr>
-          <a:xfrm>
-            <a:off x="3120025" y="4730219"/>
-            <a:ext cx="1427767" cy="369332"/>
-          </a:xfrm>
-          <a:prstGeom prst="rect">
-            <a:avLst/>
-          </a:prstGeom>
-          <a:noFill/>
-        </p:spPr>
-        <p:txBody>
-          <a:bodyPr wrap="square" rtlCol="0">
-            <a:spAutoFit/>
-          </a:bodyPr>
-          <a:lstStyle/>
-          <a:p>
-            <a:r>
-              <a:rPr lang="pt-PT" dirty="0"/>
-              <a:t>001d43</a:t>
-            </a:r>
-            <a:endParaRPr lang="en-AT" dirty="0"/>
-          </a:p>
-        </p:txBody>
-      </p:sp>
-      <p:sp>
-        <p:nvSpPr>
-          <p:cNvPr id="6" name="TextBox 5">
-            <a:extLst>
-              <a:ext uri="{FF2B5EF4-FFF2-40B4-BE49-F238E27FC236}">
-                <a16:creationId xmlns:a16="http://schemas.microsoft.com/office/drawing/2014/main" id="{A4D97030-07CD-BF66-695D-1461DC704A14}"/>
-              </a:ext>
-            </a:extLst>
-          </p:cNvPr>
-          <p:cNvSpPr txBox="1"/>
-          <p:nvPr/>
-        </p:nvSpPr>
-        <p:spPr>
-          <a:xfrm>
-            <a:off x="5053409" y="4838695"/>
-            <a:ext cx="1427767" cy="369332"/>
-          </a:xfrm>
-          <a:prstGeom prst="rect">
-            <a:avLst/>
-          </a:prstGeom>
-          <a:noFill/>
-        </p:spPr>
-        <p:txBody>
-          <a:bodyPr wrap="square" rtlCol="0">
-            <a:spAutoFit/>
-          </a:bodyPr>
-          <a:lstStyle/>
-          <a:p>
-            <a:r>
-              <a:rPr lang="pt-PT" dirty="0"/>
-              <a:t>cacccc</a:t>
-            </a:r>
-            <a:endParaRPr lang="en-AT" dirty="0"/>
-          </a:p>
-        </p:txBody>
-      </p:sp>
-      <p:sp>
-        <p:nvSpPr>
-          <p:cNvPr id="10" name="TextBox 9">
-            <a:extLst>
-              <a:ext uri="{FF2B5EF4-FFF2-40B4-BE49-F238E27FC236}">
-                <a16:creationId xmlns:a16="http://schemas.microsoft.com/office/drawing/2014/main" id="{44A40E40-8F2D-0A42-3CC2-80DE0D8586B3}"/>
-              </a:ext>
-            </a:extLst>
-          </p:cNvPr>
-          <p:cNvSpPr txBox="1"/>
-          <p:nvPr/>
-        </p:nvSpPr>
-        <p:spPr>
-          <a:xfrm>
-            <a:off x="7560539" y="4654029"/>
-            <a:ext cx="1427767" cy="369332"/>
-          </a:xfrm>
-          <a:prstGeom prst="rect">
-            <a:avLst/>
-          </a:prstGeom>
-          <a:noFill/>
-        </p:spPr>
-        <p:txBody>
-          <a:bodyPr wrap="square" rtlCol="0">
-            <a:spAutoFit/>
-          </a:bodyPr>
-          <a:lstStyle/>
-          <a:p>
-            <a:r>
-              <a:rPr lang="pt-PT" dirty="0"/>
-              <a:t>444444</a:t>
-            </a:r>
-            <a:endParaRPr lang="en-AT" dirty="0"/>
-          </a:p>
-        </p:txBody>
-      </p:sp>
-    </p:spTree>
-    <p:extLst>
-      <p:ext uri="{BB962C8B-B14F-4D97-AF65-F5344CB8AC3E}">
-        <p14:creationId xmlns:p14="http://schemas.microsoft.com/office/powerpoint/2010/main" val="1811072003"/>
-      </p:ext>
-    </p:extLst>
-  </p:cSld>
-  <p:clrMapOvr>
-    <a:masterClrMapping/>
-  </p:clrMapOvr>
-</p:sld>
-</file>
-
-<file path=ppt/slides/slide2.xml><?xml version="1.0" encoding="utf-8"?>
 <p:sld xmlns:a="http://schemas.openxmlformats.org/drawingml/2006/main" xmlns:r="http://schemas.openxmlformats.org/officeDocument/2006/relationships" xmlns:p="http://schemas.openxmlformats.org/presentationml/2006/main">
   <p:cSld>
     <p:spTree>
@@ -5159,8 +4638,8 @@
         </p:nvSpPr>
         <p:spPr>
           <a:xfrm>
-            <a:off x="0" y="0"/>
-            <a:ext cx="9601200" cy="1009650"/>
+            <a:off x="0" y="-23628"/>
+            <a:ext cx="9601200" cy="1033278"/>
           </a:xfrm>
           <a:prstGeom prst="rect">
             <a:avLst/>
@@ -7189,7 +6668,7 @@
         </p:blipFill>
         <p:spPr>
           <a:xfrm>
-            <a:off x="4874559" y="4121903"/>
+            <a:off x="4874559" y="4182863"/>
             <a:ext cx="4417973" cy="1893417"/>
           </a:xfrm>
           <a:prstGeom prst="rect">
@@ -7225,7 +6704,7 @@
         </p:blipFill>
         <p:spPr>
           <a:xfrm>
-            <a:off x="2411309" y="10821533"/>
+            <a:off x="2506189" y="10838845"/>
             <a:ext cx="2220452" cy="1480301"/>
           </a:xfrm>
           <a:prstGeom prst="rect">
@@ -7391,10 +6870,10 @@
         </p:nvGrpSpPr>
         <p:grpSpPr>
           <a:xfrm>
-            <a:off x="244390" y="10849500"/>
-            <a:ext cx="1917269" cy="1205341"/>
-            <a:chOff x="952760" y="3036178"/>
-            <a:chExt cx="3319272" cy="1535109"/>
+            <a:off x="267478" y="10735787"/>
+            <a:ext cx="2220452" cy="1583362"/>
+            <a:chOff x="952760" y="3058027"/>
+            <a:chExt cx="3319272" cy="1513260"/>
           </a:xfrm>
         </p:grpSpPr>
         <p:sp>
@@ -7557,6 +7036,20 @@
               <a:pPr algn="ctr">
                 <a:defRPr/>
               </a:pPr>
+              <a:endParaRPr lang="en-GB" sz="100" dirty="0">
+                <a:solidFill>
+                  <a:prstClr val="black">
+                    <a:lumMod val="65000"/>
+                    <a:lumOff val="35000"/>
+                  </a:prstClr>
+                </a:solidFill>
+                <a:latin typeface="Calibri" panose="020F0502020204030204"/>
+              </a:endParaRPr>
+            </a:p>
+            <a:p>
+              <a:pPr algn="ctr">
+                <a:defRPr/>
+              </a:pPr>
               <a:r>
                 <a:rPr lang="en-GB" sz="1400" dirty="0">
                   <a:solidFill>
@@ -7579,7 +7072,7 @@
                   </a:solidFill>
                   <a:latin typeface="Calibri" panose="020F0502020204030204"/>
                 </a:rPr>
-                <a:t>nearly half of all flights </a:t>
+                <a:t>nearly half of all flights</a:t>
               </a:r>
               <a:r>
                 <a:rPr lang="en-GB" sz="1400" dirty="0">
@@ -7591,7 +7084,7 @@
                   </a:solidFill>
                   <a:latin typeface="Calibri" panose="020F0502020204030204"/>
                 </a:rPr>
-                <a:t>and lead national growth.</a:t>
+                <a:t>. This offers a great opportunity for targeted services in that area.</a:t>
               </a:r>
               <a:endParaRPr kumimoji="0" lang="en-US" sz="1400" b="0" i="0" u="none" strike="noStrike" kern="1200" cap="none" spc="0" normalizeH="0" baseline="0" noProof="1">
                 <a:ln>
@@ -7627,8 +7120,8 @@
           </p:nvSpPr>
           <p:spPr>
             <a:xfrm>
-              <a:off x="1094949" y="3036178"/>
-              <a:ext cx="3046538" cy="331361"/>
+              <a:off x="1094948" y="3058027"/>
+              <a:ext cx="3046539" cy="331361"/>
             </a:xfrm>
             <a:custGeom>
               <a:avLst/>
@@ -7992,3000 +7485,6 @@
     <p:extLst>
       <p:ext uri="{BB962C8B-B14F-4D97-AF65-F5344CB8AC3E}">
         <p14:creationId xmlns:p14="http://schemas.microsoft.com/office/powerpoint/2010/main" val="4109937878"/>
-      </p:ext>
-    </p:extLst>
-  </p:cSld>
-  <p:clrMapOvr>
-    <a:masterClrMapping/>
-  </p:clrMapOvr>
-</p:sld>
-</file>
-
-<file path=ppt/slides/slide3.xml><?xml version="1.0" encoding="utf-8"?>
-<p:sld xmlns:a="http://schemas.openxmlformats.org/drawingml/2006/main" xmlns:r="http://schemas.openxmlformats.org/officeDocument/2006/relationships" xmlns:p="http://schemas.openxmlformats.org/presentationml/2006/main" show="0">
-  <p:cSld>
-    <p:spTree>
-      <p:nvGrpSpPr>
-        <p:cNvPr id="1" name="">
-          <a:extLst>
-            <a:ext uri="{FF2B5EF4-FFF2-40B4-BE49-F238E27FC236}">
-              <a16:creationId xmlns:a16="http://schemas.microsoft.com/office/drawing/2014/main" id="{1E55625C-CC42-9133-3284-BE4C72FBE15D}"/>
-            </a:ext>
-          </a:extLst>
-        </p:cNvPr>
-        <p:cNvGrpSpPr/>
-        <p:nvPr/>
-      </p:nvGrpSpPr>
-      <p:grpSpPr>
-        <a:xfrm>
-          <a:off x="0" y="0"/>
-          <a:ext cx="0" cy="0"/>
-          <a:chOff x="0" y="0"/>
-          <a:chExt cx="0" cy="0"/>
-        </a:xfrm>
-      </p:grpSpPr>
-      <p:sp>
-        <p:nvSpPr>
-          <p:cNvPr id="10" name="TextBox 9">
-            <a:extLst>
-              <a:ext uri="{FF2B5EF4-FFF2-40B4-BE49-F238E27FC236}">
-                <a16:creationId xmlns:a16="http://schemas.microsoft.com/office/drawing/2014/main" id="{B8DCFF82-5E05-E974-56BC-AA80F799C112}"/>
-              </a:ext>
-            </a:extLst>
-          </p:cNvPr>
-          <p:cNvSpPr txBox="1"/>
-          <p:nvPr/>
-        </p:nvSpPr>
-        <p:spPr>
-          <a:xfrm>
-            <a:off x="5267325" y="1186416"/>
-            <a:ext cx="2406650" cy="369332"/>
-          </a:xfrm>
-          <a:prstGeom prst="rect">
-            <a:avLst/>
-          </a:prstGeom>
-          <a:noFill/>
-        </p:spPr>
-        <p:txBody>
-          <a:bodyPr wrap="square" rtlCol="0">
-            <a:spAutoFit/>
-          </a:bodyPr>
-          <a:lstStyle/>
-          <a:p>
-            <a:endParaRPr lang="en-AT" dirty="0"/>
-          </a:p>
-        </p:txBody>
-      </p:sp>
-      <p:sp>
-        <p:nvSpPr>
-          <p:cNvPr id="12" name="Rectangle 11">
-            <a:extLst>
-              <a:ext uri="{FF2B5EF4-FFF2-40B4-BE49-F238E27FC236}">
-                <a16:creationId xmlns:a16="http://schemas.microsoft.com/office/drawing/2014/main" id="{8B0AF367-E790-4F02-5A13-585458E011FC}"/>
-              </a:ext>
-            </a:extLst>
-          </p:cNvPr>
-          <p:cNvSpPr/>
-          <p:nvPr/>
-        </p:nvSpPr>
-        <p:spPr>
-          <a:xfrm>
-            <a:off x="0" y="0"/>
-            <a:ext cx="9601200" cy="1009650"/>
-          </a:xfrm>
-          <a:prstGeom prst="rect">
-            <a:avLst/>
-          </a:prstGeom>
-          <a:solidFill>
-            <a:schemeClr val="accent2"/>
-          </a:solidFill>
-          <a:ln>
-            <a:noFill/>
-          </a:ln>
-        </p:spPr>
-        <p:style>
-          <a:lnRef idx="2">
-            <a:schemeClr val="accent1">
-              <a:shade val="15000"/>
-            </a:schemeClr>
-          </a:lnRef>
-          <a:fillRef idx="1">
-            <a:schemeClr val="accent1"/>
-          </a:fillRef>
-          <a:effectRef idx="0">
-            <a:schemeClr val="accent1"/>
-          </a:effectRef>
-          <a:fontRef idx="minor">
-            <a:schemeClr val="lt1"/>
-          </a:fontRef>
-        </p:style>
-        <p:txBody>
-          <a:bodyPr rtlCol="0" anchor="ctr"/>
-          <a:lstStyle/>
-          <a:p>
-            <a:pPr algn="ctr"/>
-            <a:r>
-              <a:rPr lang="en-GB" sz="4000" b="1" dirty="0"/>
-              <a:t>Amazing Airlines Customer Analysis</a:t>
-            </a:r>
-            <a:endParaRPr lang="en-AT" sz="4000" b="1" dirty="0"/>
-          </a:p>
-        </p:txBody>
-      </p:sp>
-      <p:grpSp>
-        <p:nvGrpSpPr>
-          <p:cNvPr id="34" name="Group 33">
-            <a:extLst>
-              <a:ext uri="{FF2B5EF4-FFF2-40B4-BE49-F238E27FC236}">
-                <a16:creationId xmlns:a16="http://schemas.microsoft.com/office/drawing/2014/main" id="{C0B042CD-FBC4-933A-A7BE-78A5728D7DD9}"/>
-              </a:ext>
-            </a:extLst>
-          </p:cNvPr>
-          <p:cNvGrpSpPr/>
-          <p:nvPr/>
-        </p:nvGrpSpPr>
-        <p:grpSpPr>
-          <a:xfrm>
-            <a:off x="562010" y="6150865"/>
-            <a:ext cx="3698598" cy="1395971"/>
-            <a:chOff x="952760" y="3036178"/>
-            <a:chExt cx="3319272" cy="1831883"/>
-          </a:xfrm>
-        </p:grpSpPr>
-        <p:sp>
-          <p:nvSpPr>
-            <p:cNvPr id="35" name="Rectangle: Rounded Corners 34">
-              <a:extLst>
-                <a:ext uri="{FF2B5EF4-FFF2-40B4-BE49-F238E27FC236}">
-                  <a16:creationId xmlns:a16="http://schemas.microsoft.com/office/drawing/2014/main" id="{4D888477-138F-5B0B-F755-181393E0E058}"/>
-                </a:ext>
-              </a:extLst>
-            </p:cNvPr>
-            <p:cNvSpPr/>
-            <p:nvPr/>
-          </p:nvSpPr>
-          <p:spPr>
-            <a:xfrm>
-              <a:off x="952760" y="3201261"/>
-              <a:ext cx="3319272" cy="1666800"/>
-            </a:xfrm>
-            <a:prstGeom prst="roundRect">
-              <a:avLst>
-                <a:gd name="adj" fmla="val 15145"/>
-              </a:avLst>
-            </a:prstGeom>
-            <a:noFill/>
-            <a:ln w="28575">
-              <a:solidFill>
-                <a:srgbClr val="CACCCC"/>
-              </a:solidFill>
-            </a:ln>
-          </p:spPr>
-          <p:style>
-            <a:lnRef idx="2">
-              <a:schemeClr val="accent1">
-                <a:shade val="50000"/>
-              </a:schemeClr>
-            </a:lnRef>
-            <a:fillRef idx="1">
-              <a:schemeClr val="accent1"/>
-            </a:fillRef>
-            <a:effectRef idx="0">
-              <a:schemeClr val="accent1"/>
-            </a:effectRef>
-            <a:fontRef idx="minor">
-              <a:schemeClr val="lt1"/>
-            </a:fontRef>
-          </p:style>
-          <p:txBody>
-            <a:bodyPr rtlCol="0" anchor="t"/>
-            <a:lstStyle>
-              <a:defPPr>
-                <a:defRPr lang="en-US"/>
-              </a:defPPr>
-              <a:lvl1pPr marL="0" algn="l" defTabSz="914400" rtl="0" eaLnBrk="1" latinLnBrk="0" hangingPunct="1">
-                <a:defRPr sz="1800" kern="1200">
-                  <a:solidFill>
-                    <a:schemeClr val="lt1"/>
-                  </a:solidFill>
-                  <a:latin typeface="+mn-lt"/>
-                  <a:ea typeface="+mn-ea"/>
-                  <a:cs typeface="+mn-cs"/>
-                </a:defRPr>
-              </a:lvl1pPr>
-              <a:lvl2pPr marL="457200" algn="l" defTabSz="914400" rtl="0" eaLnBrk="1" latinLnBrk="0" hangingPunct="1">
-                <a:defRPr sz="1800" kern="1200">
-                  <a:solidFill>
-                    <a:schemeClr val="lt1"/>
-                  </a:solidFill>
-                  <a:latin typeface="+mn-lt"/>
-                  <a:ea typeface="+mn-ea"/>
-                  <a:cs typeface="+mn-cs"/>
-                </a:defRPr>
-              </a:lvl2pPr>
-              <a:lvl3pPr marL="914400" algn="l" defTabSz="914400" rtl="0" eaLnBrk="1" latinLnBrk="0" hangingPunct="1">
-                <a:defRPr sz="1800" kern="1200">
-                  <a:solidFill>
-                    <a:schemeClr val="lt1"/>
-                  </a:solidFill>
-                  <a:latin typeface="+mn-lt"/>
-                  <a:ea typeface="+mn-ea"/>
-                  <a:cs typeface="+mn-cs"/>
-                </a:defRPr>
-              </a:lvl3pPr>
-              <a:lvl4pPr marL="1371600" algn="l" defTabSz="914400" rtl="0" eaLnBrk="1" latinLnBrk="0" hangingPunct="1">
-                <a:defRPr sz="1800" kern="1200">
-                  <a:solidFill>
-                    <a:schemeClr val="lt1"/>
-                  </a:solidFill>
-                  <a:latin typeface="+mn-lt"/>
-                  <a:ea typeface="+mn-ea"/>
-                  <a:cs typeface="+mn-cs"/>
-                </a:defRPr>
-              </a:lvl4pPr>
-              <a:lvl5pPr marL="1828800" algn="l" defTabSz="914400" rtl="0" eaLnBrk="1" latinLnBrk="0" hangingPunct="1">
-                <a:defRPr sz="1800" kern="1200">
-                  <a:solidFill>
-                    <a:schemeClr val="lt1"/>
-                  </a:solidFill>
-                  <a:latin typeface="+mn-lt"/>
-                  <a:ea typeface="+mn-ea"/>
-                  <a:cs typeface="+mn-cs"/>
-                </a:defRPr>
-              </a:lvl5pPr>
-              <a:lvl6pPr marL="2286000" algn="l" defTabSz="914400" rtl="0" eaLnBrk="1" latinLnBrk="0" hangingPunct="1">
-                <a:defRPr sz="1800" kern="1200">
-                  <a:solidFill>
-                    <a:schemeClr val="lt1"/>
-                  </a:solidFill>
-                  <a:latin typeface="+mn-lt"/>
-                  <a:ea typeface="+mn-ea"/>
-                  <a:cs typeface="+mn-cs"/>
-                </a:defRPr>
-              </a:lvl6pPr>
-              <a:lvl7pPr marL="2743200" algn="l" defTabSz="914400" rtl="0" eaLnBrk="1" latinLnBrk="0" hangingPunct="1">
-                <a:defRPr sz="1800" kern="1200">
-                  <a:solidFill>
-                    <a:schemeClr val="lt1"/>
-                  </a:solidFill>
-                  <a:latin typeface="+mn-lt"/>
-                  <a:ea typeface="+mn-ea"/>
-                  <a:cs typeface="+mn-cs"/>
-                </a:defRPr>
-              </a:lvl7pPr>
-              <a:lvl8pPr marL="3200400" algn="l" defTabSz="914400" rtl="0" eaLnBrk="1" latinLnBrk="0" hangingPunct="1">
-                <a:defRPr sz="1800" kern="1200">
-                  <a:solidFill>
-                    <a:schemeClr val="lt1"/>
-                  </a:solidFill>
-                  <a:latin typeface="+mn-lt"/>
-                  <a:ea typeface="+mn-ea"/>
-                  <a:cs typeface="+mn-cs"/>
-                </a:defRPr>
-              </a:lvl8pPr>
-              <a:lvl9pPr marL="3657600" algn="l" defTabSz="914400" rtl="0" eaLnBrk="1" latinLnBrk="0" hangingPunct="1">
-                <a:defRPr sz="1800" kern="1200">
-                  <a:solidFill>
-                    <a:schemeClr val="lt1"/>
-                  </a:solidFill>
-                  <a:latin typeface="+mn-lt"/>
-                  <a:ea typeface="+mn-ea"/>
-                  <a:cs typeface="+mn-cs"/>
-                </a:defRPr>
-              </a:lvl9pPr>
-            </a:lstStyle>
-            <a:p>
-              <a:pPr lvl="0" algn="ctr">
-                <a:defRPr/>
-              </a:pPr>
-              <a:endParaRPr kumimoji="0" lang="en-US" sz="300" b="0" i="0" u="none" strike="noStrike" kern="1200" cap="none" spc="0" normalizeH="0" baseline="0" noProof="1">
-                <a:ln>
-                  <a:noFill/>
-                </a:ln>
-                <a:solidFill>
-                  <a:prstClr val="black">
-                    <a:lumMod val="65000"/>
-                    <a:lumOff val="35000"/>
-                  </a:prstClr>
-                </a:solidFill>
-                <a:effectLst/>
-                <a:uLnTx/>
-                <a:uFillTx/>
-                <a:latin typeface="Calibri" panose="020F0502020204030204"/>
-                <a:ea typeface="+mn-ea"/>
-                <a:cs typeface="+mn-cs"/>
-              </a:endParaRPr>
-            </a:p>
-            <a:p>
-              <a:pPr lvl="0" algn="ctr">
-                <a:defRPr/>
-              </a:pPr>
-              <a:r>
-                <a:rPr kumimoji="0" lang="en-US" sz="1400" b="0" i="0" u="none" strike="noStrike" kern="1200" cap="none" spc="0" normalizeH="0" baseline="0" noProof="1">
-                  <a:ln>
-                    <a:noFill/>
-                  </a:ln>
-                  <a:solidFill>
-                    <a:prstClr val="black">
-                      <a:lumMod val="65000"/>
-                      <a:lumOff val="35000"/>
-                    </a:prstClr>
-                  </a:solidFill>
-                  <a:effectLst/>
-                  <a:uLnTx/>
-                  <a:uFillTx/>
-                  <a:latin typeface="Calibri" panose="020F0502020204030204"/>
-                  <a:ea typeface="+mn-ea"/>
-                  <a:cs typeface="+mn-cs"/>
-                </a:rPr>
-                <a:t>As shown above, there is </a:t>
-              </a:r>
-              <a:r>
-                <a:rPr kumimoji="0" lang="en-US" sz="1400" b="1" i="0" u="none" strike="noStrike" kern="1200" cap="none" spc="0" normalizeH="0" baseline="0" noProof="1">
-                  <a:ln>
-                    <a:noFill/>
-                  </a:ln>
-                  <a:solidFill>
-                    <a:prstClr val="black">
-                      <a:lumMod val="65000"/>
-                      <a:lumOff val="35000"/>
-                    </a:prstClr>
-                  </a:solidFill>
-                  <a:effectLst/>
-                  <a:uLnTx/>
-                  <a:uFillTx/>
-                  <a:latin typeface="Calibri" panose="020F0502020204030204"/>
-                  <a:ea typeface="+mn-ea"/>
-                  <a:cs typeface="+mn-cs"/>
-                </a:rPr>
-                <a:t>no clear behavioral distinction</a:t>
-              </a:r>
-              <a:r>
-                <a:rPr kumimoji="0" lang="en-US" sz="1400" b="0" i="0" u="none" strike="noStrike" kern="1200" cap="none" spc="0" normalizeH="0" baseline="0" noProof="1">
-                  <a:ln>
-                    <a:noFill/>
-                  </a:ln>
-                  <a:solidFill>
-                    <a:prstClr val="black">
-                      <a:lumMod val="65000"/>
-                      <a:lumOff val="35000"/>
-                    </a:prstClr>
-                  </a:solidFill>
-                  <a:effectLst/>
-                  <a:uLnTx/>
-                  <a:uFillTx/>
-                  <a:latin typeface="Calibri" panose="020F0502020204030204"/>
-                  <a:ea typeface="+mn-ea"/>
-                  <a:cs typeface="+mn-cs"/>
-                </a:rPr>
-                <a:t> between customers across loyalty segments. This shows the </a:t>
-              </a:r>
-              <a:r>
-                <a:rPr kumimoji="0" lang="en-US" sz="1400" b="1" i="0" u="none" strike="noStrike" kern="1200" cap="none" spc="0" normalizeH="0" baseline="0" noProof="1">
-                  <a:ln>
-                    <a:noFill/>
-                  </a:ln>
-                  <a:solidFill>
-                    <a:prstClr val="black">
-                      <a:lumMod val="65000"/>
-                      <a:lumOff val="35000"/>
-                    </a:prstClr>
-                  </a:solidFill>
-                  <a:effectLst/>
-                  <a:uLnTx/>
-                  <a:uFillTx/>
-                  <a:latin typeface="Calibri" panose="020F0502020204030204"/>
-                  <a:ea typeface="+mn-ea"/>
-                  <a:cs typeface="+mn-cs"/>
-                </a:rPr>
-                <a:t>need for a new approach to customer segmentation </a:t>
-              </a:r>
-              <a:r>
-                <a:rPr kumimoji="0" lang="en-US" sz="1400" b="0" i="0" u="none" strike="noStrike" kern="1200" cap="none" spc="0" normalizeH="0" baseline="0" noProof="1">
-                  <a:ln>
-                    <a:noFill/>
-                  </a:ln>
-                  <a:solidFill>
-                    <a:prstClr val="black">
-                      <a:lumMod val="65000"/>
-                      <a:lumOff val="35000"/>
-                    </a:prstClr>
-                  </a:solidFill>
-                  <a:effectLst/>
-                  <a:uLnTx/>
-                  <a:uFillTx/>
-                  <a:latin typeface="Calibri" panose="020F0502020204030204"/>
-                  <a:ea typeface="+mn-ea"/>
-                  <a:cs typeface="+mn-cs"/>
-                </a:rPr>
-                <a:t>and a rethinking of the existing loyalty program. </a:t>
-              </a:r>
-            </a:p>
-          </p:txBody>
-        </p:sp>
-        <p:sp>
-          <p:nvSpPr>
-            <p:cNvPr id="36" name="Freeform: Shape 35">
-              <a:extLst>
-                <a:ext uri="{FF2B5EF4-FFF2-40B4-BE49-F238E27FC236}">
-                  <a16:creationId xmlns:a16="http://schemas.microsoft.com/office/drawing/2014/main" id="{947BF8D3-8580-300D-4288-43129A711FE8}"/>
-                </a:ext>
-              </a:extLst>
-            </p:cNvPr>
-            <p:cNvSpPr/>
-            <p:nvPr/>
-          </p:nvSpPr>
-          <p:spPr>
-            <a:xfrm>
-              <a:off x="1094949" y="3036178"/>
-              <a:ext cx="3046538" cy="331361"/>
-            </a:xfrm>
-            <a:custGeom>
-              <a:avLst/>
-              <a:gdLst>
-                <a:gd name="connsiteX0" fmla="*/ 351094 w 3046538"/>
-                <a:gd name="connsiteY0" fmla="*/ 0 h 331361"/>
-                <a:gd name="connsiteX1" fmla="*/ 2683799 w 3046538"/>
-                <a:gd name="connsiteY1" fmla="*/ 0 h 331361"/>
-                <a:gd name="connsiteX2" fmla="*/ 2743299 w 3046538"/>
-                <a:gd name="connsiteY2" fmla="*/ 12013 h 331361"/>
-                <a:gd name="connsiteX3" fmla="*/ 2743789 w 3046538"/>
-                <a:gd name="connsiteY3" fmla="*/ 12343 h 331361"/>
-                <a:gd name="connsiteX4" fmla="*/ 2747886 w 3046538"/>
-                <a:gd name="connsiteY4" fmla="*/ 13140 h 331361"/>
-                <a:gd name="connsiteX5" fmla="*/ 2802334 w 3046538"/>
-                <a:gd name="connsiteY5" fmla="*/ 49296 h 331361"/>
-                <a:gd name="connsiteX6" fmla="*/ 3046538 w 3046538"/>
-                <a:gd name="connsiteY6" fmla="*/ 165680 h 331361"/>
-                <a:gd name="connsiteX7" fmla="*/ 2802334 w 3046538"/>
-                <a:gd name="connsiteY7" fmla="*/ 282064 h 331361"/>
-                <a:gd name="connsiteX8" fmla="*/ 2747886 w 3046538"/>
-                <a:gd name="connsiteY8" fmla="*/ 318220 h 331361"/>
-                <a:gd name="connsiteX9" fmla="*/ 2743791 w 3046538"/>
-                <a:gd name="connsiteY9" fmla="*/ 319017 h 331361"/>
-                <a:gd name="connsiteX10" fmla="*/ 2743299 w 3046538"/>
-                <a:gd name="connsiteY10" fmla="*/ 319349 h 331361"/>
-                <a:gd name="connsiteX11" fmla="*/ 2683799 w 3046538"/>
-                <a:gd name="connsiteY11" fmla="*/ 331361 h 331361"/>
-                <a:gd name="connsiteX12" fmla="*/ 351094 w 3046538"/>
-                <a:gd name="connsiteY12" fmla="*/ 331361 h 331361"/>
-                <a:gd name="connsiteX13" fmla="*/ 243006 w 3046538"/>
-                <a:gd name="connsiteY13" fmla="*/ 286589 h 331361"/>
-                <a:gd name="connsiteX14" fmla="*/ 193128 w 3046538"/>
-                <a:gd name="connsiteY14" fmla="*/ 241208 h 331361"/>
-                <a:gd name="connsiteX15" fmla="*/ 0 w 3046538"/>
-                <a:gd name="connsiteY15" fmla="*/ 165680 h 331361"/>
-                <a:gd name="connsiteX16" fmla="*/ 193128 w 3046538"/>
-                <a:gd name="connsiteY16" fmla="*/ 90152 h 331361"/>
-                <a:gd name="connsiteX17" fmla="*/ 237522 w 3046538"/>
-                <a:gd name="connsiteY17" fmla="*/ 52906 h 331361"/>
-                <a:gd name="connsiteX18" fmla="*/ 243006 w 3046538"/>
-                <a:gd name="connsiteY18" fmla="*/ 44772 h 331361"/>
-                <a:gd name="connsiteX19" fmla="*/ 351094 w 3046538"/>
-                <a:gd name="connsiteY19" fmla="*/ 0 h 331361"/>
-                <a:gd name="connsiteX0" fmla="*/ 351094 w 3046538"/>
-                <a:gd name="connsiteY0" fmla="*/ 0 h 331361"/>
-                <a:gd name="connsiteX1" fmla="*/ 2683799 w 3046538"/>
-                <a:gd name="connsiteY1" fmla="*/ 0 h 331361"/>
-                <a:gd name="connsiteX2" fmla="*/ 2743299 w 3046538"/>
-                <a:gd name="connsiteY2" fmla="*/ 12013 h 331361"/>
-                <a:gd name="connsiteX3" fmla="*/ 2743789 w 3046538"/>
-                <a:gd name="connsiteY3" fmla="*/ 12343 h 331361"/>
-                <a:gd name="connsiteX4" fmla="*/ 2747886 w 3046538"/>
-                <a:gd name="connsiteY4" fmla="*/ 13140 h 331361"/>
-                <a:gd name="connsiteX5" fmla="*/ 2802334 w 3046538"/>
-                <a:gd name="connsiteY5" fmla="*/ 49296 h 331361"/>
-                <a:gd name="connsiteX6" fmla="*/ 3046538 w 3046538"/>
-                <a:gd name="connsiteY6" fmla="*/ 165680 h 331361"/>
-                <a:gd name="connsiteX7" fmla="*/ 2802334 w 3046538"/>
-                <a:gd name="connsiteY7" fmla="*/ 282064 h 331361"/>
-                <a:gd name="connsiteX8" fmla="*/ 2747886 w 3046538"/>
-                <a:gd name="connsiteY8" fmla="*/ 318220 h 331361"/>
-                <a:gd name="connsiteX9" fmla="*/ 2743791 w 3046538"/>
-                <a:gd name="connsiteY9" fmla="*/ 319017 h 331361"/>
-                <a:gd name="connsiteX10" fmla="*/ 2743299 w 3046538"/>
-                <a:gd name="connsiteY10" fmla="*/ 319349 h 331361"/>
-                <a:gd name="connsiteX11" fmla="*/ 2683799 w 3046538"/>
-                <a:gd name="connsiteY11" fmla="*/ 331361 h 331361"/>
-                <a:gd name="connsiteX12" fmla="*/ 351094 w 3046538"/>
-                <a:gd name="connsiteY12" fmla="*/ 331361 h 331361"/>
-                <a:gd name="connsiteX13" fmla="*/ 243006 w 3046538"/>
-                <a:gd name="connsiteY13" fmla="*/ 286589 h 331361"/>
-                <a:gd name="connsiteX14" fmla="*/ 193128 w 3046538"/>
-                <a:gd name="connsiteY14" fmla="*/ 241208 h 331361"/>
-                <a:gd name="connsiteX15" fmla="*/ 0 w 3046538"/>
-                <a:gd name="connsiteY15" fmla="*/ 165680 h 331361"/>
-                <a:gd name="connsiteX16" fmla="*/ 193128 w 3046538"/>
-                <a:gd name="connsiteY16" fmla="*/ 90152 h 331361"/>
-                <a:gd name="connsiteX17" fmla="*/ 243006 w 3046538"/>
-                <a:gd name="connsiteY17" fmla="*/ 44772 h 331361"/>
-                <a:gd name="connsiteX18" fmla="*/ 351094 w 3046538"/>
-                <a:gd name="connsiteY18" fmla="*/ 0 h 331361"/>
-              </a:gdLst>
-              <a:ahLst/>
-              <a:cxnLst>
-                <a:cxn ang="0">
-                  <a:pos x="connsiteX0" y="connsiteY0"/>
-                </a:cxn>
-                <a:cxn ang="0">
-                  <a:pos x="connsiteX1" y="connsiteY1"/>
-                </a:cxn>
-                <a:cxn ang="0">
-                  <a:pos x="connsiteX2" y="connsiteY2"/>
-                </a:cxn>
-                <a:cxn ang="0">
-                  <a:pos x="connsiteX3" y="connsiteY3"/>
-                </a:cxn>
-                <a:cxn ang="0">
-                  <a:pos x="connsiteX4" y="connsiteY4"/>
-                </a:cxn>
-                <a:cxn ang="0">
-                  <a:pos x="connsiteX5" y="connsiteY5"/>
-                </a:cxn>
-                <a:cxn ang="0">
-                  <a:pos x="connsiteX6" y="connsiteY6"/>
-                </a:cxn>
-                <a:cxn ang="0">
-                  <a:pos x="connsiteX7" y="connsiteY7"/>
-                </a:cxn>
-                <a:cxn ang="0">
-                  <a:pos x="connsiteX8" y="connsiteY8"/>
-                </a:cxn>
-                <a:cxn ang="0">
-                  <a:pos x="connsiteX9" y="connsiteY9"/>
-                </a:cxn>
-                <a:cxn ang="0">
-                  <a:pos x="connsiteX10" y="connsiteY10"/>
-                </a:cxn>
-                <a:cxn ang="0">
-                  <a:pos x="connsiteX11" y="connsiteY11"/>
-                </a:cxn>
-                <a:cxn ang="0">
-                  <a:pos x="connsiteX12" y="connsiteY12"/>
-                </a:cxn>
-                <a:cxn ang="0">
-                  <a:pos x="connsiteX13" y="connsiteY13"/>
-                </a:cxn>
-                <a:cxn ang="0">
-                  <a:pos x="connsiteX14" y="connsiteY14"/>
-                </a:cxn>
-                <a:cxn ang="0">
-                  <a:pos x="connsiteX15" y="connsiteY15"/>
-                </a:cxn>
-                <a:cxn ang="0">
-                  <a:pos x="connsiteX16" y="connsiteY16"/>
-                </a:cxn>
-                <a:cxn ang="0">
-                  <a:pos x="connsiteX17" y="connsiteY17"/>
-                </a:cxn>
-                <a:cxn ang="0">
-                  <a:pos x="connsiteX18" y="connsiteY18"/>
-                </a:cxn>
-              </a:cxnLst>
-              <a:rect l="l" t="t" r="r" b="b"/>
-              <a:pathLst>
-                <a:path w="3046538" h="331361">
-                  <a:moveTo>
-                    <a:pt x="351094" y="0"/>
-                  </a:moveTo>
-                  <a:lnTo>
-                    <a:pt x="2683799" y="0"/>
-                  </a:lnTo>
-                  <a:cubicBezTo>
-                    <a:pt x="2704905" y="0"/>
-                    <a:pt x="2725011" y="4278"/>
-                    <a:pt x="2743299" y="12013"/>
-                  </a:cubicBezTo>
-                  <a:lnTo>
-                    <a:pt x="2743789" y="12343"/>
-                  </a:lnTo>
-                  <a:lnTo>
-                    <a:pt x="2747886" y="13140"/>
-                  </a:lnTo>
-                  <a:cubicBezTo>
-                    <a:pt x="2767699" y="21175"/>
-                    <a:pt x="2786265" y="33227"/>
-                    <a:pt x="2802334" y="49296"/>
-                  </a:cubicBezTo>
-                  <a:cubicBezTo>
-                    <a:pt x="2862432" y="109394"/>
-                    <a:pt x="2943833" y="148189"/>
-                    <a:pt x="3046538" y="165680"/>
-                  </a:cubicBezTo>
-                  <a:cubicBezTo>
-                    <a:pt x="2943833" y="183171"/>
-                    <a:pt x="2862432" y="221967"/>
-                    <a:pt x="2802334" y="282064"/>
-                  </a:cubicBezTo>
-                  <a:cubicBezTo>
-                    <a:pt x="2786265" y="298133"/>
-                    <a:pt x="2767699" y="310186"/>
-                    <a:pt x="2747886" y="318220"/>
-                  </a:cubicBezTo>
-                  <a:lnTo>
-                    <a:pt x="2743791" y="319017"/>
-                  </a:lnTo>
-                  <a:lnTo>
-                    <a:pt x="2743299" y="319349"/>
-                  </a:lnTo>
-                  <a:cubicBezTo>
-                    <a:pt x="2725011" y="327084"/>
-                    <a:pt x="2704905" y="331361"/>
-                    <a:pt x="2683799" y="331361"/>
-                  </a:cubicBezTo>
-                  <a:lnTo>
-                    <a:pt x="351094" y="331361"/>
-                  </a:lnTo>
-                  <a:cubicBezTo>
-                    <a:pt x="308883" y="331361"/>
-                    <a:pt x="270668" y="314252"/>
-                    <a:pt x="243006" y="286589"/>
-                  </a:cubicBezTo>
-                  <a:lnTo>
-                    <a:pt x="193128" y="241208"/>
-                  </a:lnTo>
-                  <a:cubicBezTo>
-                    <a:pt x="140512" y="204273"/>
-                    <a:pt x="76137" y="179097"/>
-                    <a:pt x="0" y="165680"/>
-                  </a:cubicBezTo>
-                  <a:cubicBezTo>
-                    <a:pt x="76137" y="152264"/>
-                    <a:pt x="140512" y="127088"/>
-                    <a:pt x="193128" y="90152"/>
-                  </a:cubicBezTo>
-                  <a:lnTo>
-                    <a:pt x="243006" y="44772"/>
-                  </a:lnTo>
-                  <a:cubicBezTo>
-                    <a:pt x="270668" y="17110"/>
-                    <a:pt x="308883" y="0"/>
-                    <a:pt x="351094" y="0"/>
-                  </a:cubicBezTo>
-                  <a:close/>
-                </a:path>
-              </a:pathLst>
-            </a:custGeom>
-            <a:solidFill>
-              <a:srgbClr val="CACCCC"/>
-            </a:solidFill>
-            <a:ln>
-              <a:solidFill>
-                <a:srgbClr val="CACCCC"/>
-              </a:solidFill>
-            </a:ln>
-          </p:spPr>
-          <p:style>
-            <a:lnRef idx="2">
-              <a:schemeClr val="accent1">
-                <a:shade val="50000"/>
-              </a:schemeClr>
-            </a:lnRef>
-            <a:fillRef idx="1">
-              <a:schemeClr val="accent1"/>
-            </a:fillRef>
-            <a:effectRef idx="0">
-              <a:schemeClr val="accent1"/>
-            </a:effectRef>
-            <a:fontRef idx="minor">
-              <a:schemeClr val="lt1"/>
-            </a:fontRef>
-          </p:style>
-          <p:txBody>
-            <a:bodyPr wrap="square" rtlCol="0" anchor="ctr">
-              <a:noAutofit/>
-            </a:bodyPr>
-            <a:lstStyle>
-              <a:defPPr>
-                <a:defRPr lang="en-US"/>
-              </a:defPPr>
-              <a:lvl1pPr marL="0" algn="l" defTabSz="914400" rtl="0" eaLnBrk="1" latinLnBrk="0" hangingPunct="1">
-                <a:defRPr sz="1800" kern="1200">
-                  <a:solidFill>
-                    <a:schemeClr val="lt1"/>
-                  </a:solidFill>
-                  <a:latin typeface="+mn-lt"/>
-                  <a:ea typeface="+mn-ea"/>
-                  <a:cs typeface="+mn-cs"/>
-                </a:defRPr>
-              </a:lvl1pPr>
-              <a:lvl2pPr marL="457200" algn="l" defTabSz="914400" rtl="0" eaLnBrk="1" latinLnBrk="0" hangingPunct="1">
-                <a:defRPr sz="1800" kern="1200">
-                  <a:solidFill>
-                    <a:schemeClr val="lt1"/>
-                  </a:solidFill>
-                  <a:latin typeface="+mn-lt"/>
-                  <a:ea typeface="+mn-ea"/>
-                  <a:cs typeface="+mn-cs"/>
-                </a:defRPr>
-              </a:lvl2pPr>
-              <a:lvl3pPr marL="914400" algn="l" defTabSz="914400" rtl="0" eaLnBrk="1" latinLnBrk="0" hangingPunct="1">
-                <a:defRPr sz="1800" kern="1200">
-                  <a:solidFill>
-                    <a:schemeClr val="lt1"/>
-                  </a:solidFill>
-                  <a:latin typeface="+mn-lt"/>
-                  <a:ea typeface="+mn-ea"/>
-                  <a:cs typeface="+mn-cs"/>
-                </a:defRPr>
-              </a:lvl3pPr>
-              <a:lvl4pPr marL="1371600" algn="l" defTabSz="914400" rtl="0" eaLnBrk="1" latinLnBrk="0" hangingPunct="1">
-                <a:defRPr sz="1800" kern="1200">
-                  <a:solidFill>
-                    <a:schemeClr val="lt1"/>
-                  </a:solidFill>
-                  <a:latin typeface="+mn-lt"/>
-                  <a:ea typeface="+mn-ea"/>
-                  <a:cs typeface="+mn-cs"/>
-                </a:defRPr>
-              </a:lvl4pPr>
-              <a:lvl5pPr marL="1828800" algn="l" defTabSz="914400" rtl="0" eaLnBrk="1" latinLnBrk="0" hangingPunct="1">
-                <a:defRPr sz="1800" kern="1200">
-                  <a:solidFill>
-                    <a:schemeClr val="lt1"/>
-                  </a:solidFill>
-                  <a:latin typeface="+mn-lt"/>
-                  <a:ea typeface="+mn-ea"/>
-                  <a:cs typeface="+mn-cs"/>
-                </a:defRPr>
-              </a:lvl5pPr>
-              <a:lvl6pPr marL="2286000" algn="l" defTabSz="914400" rtl="0" eaLnBrk="1" latinLnBrk="0" hangingPunct="1">
-                <a:defRPr sz="1800" kern="1200">
-                  <a:solidFill>
-                    <a:schemeClr val="lt1"/>
-                  </a:solidFill>
-                  <a:latin typeface="+mn-lt"/>
-                  <a:ea typeface="+mn-ea"/>
-                  <a:cs typeface="+mn-cs"/>
-                </a:defRPr>
-              </a:lvl6pPr>
-              <a:lvl7pPr marL="2743200" algn="l" defTabSz="914400" rtl="0" eaLnBrk="1" latinLnBrk="0" hangingPunct="1">
-                <a:defRPr sz="1800" kern="1200">
-                  <a:solidFill>
-                    <a:schemeClr val="lt1"/>
-                  </a:solidFill>
-                  <a:latin typeface="+mn-lt"/>
-                  <a:ea typeface="+mn-ea"/>
-                  <a:cs typeface="+mn-cs"/>
-                </a:defRPr>
-              </a:lvl7pPr>
-              <a:lvl8pPr marL="3200400" algn="l" defTabSz="914400" rtl="0" eaLnBrk="1" latinLnBrk="0" hangingPunct="1">
-                <a:defRPr sz="1800" kern="1200">
-                  <a:solidFill>
-                    <a:schemeClr val="lt1"/>
-                  </a:solidFill>
-                  <a:latin typeface="+mn-lt"/>
-                  <a:ea typeface="+mn-ea"/>
-                  <a:cs typeface="+mn-cs"/>
-                </a:defRPr>
-              </a:lvl8pPr>
-              <a:lvl9pPr marL="3657600" algn="l" defTabSz="914400" rtl="0" eaLnBrk="1" latinLnBrk="0" hangingPunct="1">
-                <a:defRPr sz="1800" kern="1200">
-                  <a:solidFill>
-                    <a:schemeClr val="lt1"/>
-                  </a:solidFill>
-                  <a:latin typeface="+mn-lt"/>
-                  <a:ea typeface="+mn-ea"/>
-                  <a:cs typeface="+mn-cs"/>
-                </a:defRPr>
-              </a:lvl9pPr>
-            </a:lstStyle>
-            <a:p>
-              <a:pPr algn="ctr"/>
-              <a:r>
-                <a:rPr lang="en-US" b="1" dirty="0">
-                  <a:solidFill>
-                    <a:schemeClr val="tx1"/>
-                  </a:solidFill>
-                </a:rPr>
-                <a:t>Analysis</a:t>
-              </a:r>
-            </a:p>
-          </p:txBody>
-        </p:sp>
-      </p:grpSp>
-      <p:grpSp>
-        <p:nvGrpSpPr>
-          <p:cNvPr id="43" name="Group 42">
-            <a:extLst>
-              <a:ext uri="{FF2B5EF4-FFF2-40B4-BE49-F238E27FC236}">
-                <a16:creationId xmlns:a16="http://schemas.microsoft.com/office/drawing/2014/main" id="{C557DF45-9433-6AA9-867D-FE585AAD8353}"/>
-              </a:ext>
-            </a:extLst>
-          </p:cNvPr>
-          <p:cNvGrpSpPr/>
-          <p:nvPr/>
-        </p:nvGrpSpPr>
-        <p:grpSpPr>
-          <a:xfrm>
-            <a:off x="5392445" y="6150865"/>
-            <a:ext cx="3698598" cy="1395971"/>
-            <a:chOff x="952760" y="3036178"/>
-            <a:chExt cx="3319272" cy="1831883"/>
-          </a:xfrm>
-        </p:grpSpPr>
-        <p:sp>
-          <p:nvSpPr>
-            <p:cNvPr id="44" name="Rectangle: Rounded Corners 43">
-              <a:extLst>
-                <a:ext uri="{FF2B5EF4-FFF2-40B4-BE49-F238E27FC236}">
-                  <a16:creationId xmlns:a16="http://schemas.microsoft.com/office/drawing/2014/main" id="{2DA641D9-B483-027F-FEA6-4682BE747F27}"/>
-                </a:ext>
-              </a:extLst>
-            </p:cNvPr>
-            <p:cNvSpPr/>
-            <p:nvPr/>
-          </p:nvSpPr>
-          <p:spPr>
-            <a:xfrm>
-              <a:off x="952760" y="3201261"/>
-              <a:ext cx="3319272" cy="1666800"/>
-            </a:xfrm>
-            <a:prstGeom prst="roundRect">
-              <a:avLst>
-                <a:gd name="adj" fmla="val 15145"/>
-              </a:avLst>
-            </a:prstGeom>
-            <a:noFill/>
-            <a:ln w="28575">
-              <a:solidFill>
-                <a:srgbClr val="CACCCC"/>
-              </a:solidFill>
-            </a:ln>
-          </p:spPr>
-          <p:style>
-            <a:lnRef idx="2">
-              <a:schemeClr val="accent1">
-                <a:shade val="50000"/>
-              </a:schemeClr>
-            </a:lnRef>
-            <a:fillRef idx="1">
-              <a:schemeClr val="accent1"/>
-            </a:fillRef>
-            <a:effectRef idx="0">
-              <a:schemeClr val="accent1"/>
-            </a:effectRef>
-            <a:fontRef idx="minor">
-              <a:schemeClr val="lt1"/>
-            </a:fontRef>
-          </p:style>
-          <p:txBody>
-            <a:bodyPr rtlCol="0" anchor="t"/>
-            <a:lstStyle>
-              <a:defPPr>
-                <a:defRPr lang="en-US"/>
-              </a:defPPr>
-              <a:lvl1pPr marL="0" algn="l" defTabSz="914400" rtl="0" eaLnBrk="1" latinLnBrk="0" hangingPunct="1">
-                <a:defRPr sz="1800" kern="1200">
-                  <a:solidFill>
-                    <a:schemeClr val="lt1"/>
-                  </a:solidFill>
-                  <a:latin typeface="+mn-lt"/>
-                  <a:ea typeface="+mn-ea"/>
-                  <a:cs typeface="+mn-cs"/>
-                </a:defRPr>
-              </a:lvl1pPr>
-              <a:lvl2pPr marL="457200" algn="l" defTabSz="914400" rtl="0" eaLnBrk="1" latinLnBrk="0" hangingPunct="1">
-                <a:defRPr sz="1800" kern="1200">
-                  <a:solidFill>
-                    <a:schemeClr val="lt1"/>
-                  </a:solidFill>
-                  <a:latin typeface="+mn-lt"/>
-                  <a:ea typeface="+mn-ea"/>
-                  <a:cs typeface="+mn-cs"/>
-                </a:defRPr>
-              </a:lvl2pPr>
-              <a:lvl3pPr marL="914400" algn="l" defTabSz="914400" rtl="0" eaLnBrk="1" latinLnBrk="0" hangingPunct="1">
-                <a:defRPr sz="1800" kern="1200">
-                  <a:solidFill>
-                    <a:schemeClr val="lt1"/>
-                  </a:solidFill>
-                  <a:latin typeface="+mn-lt"/>
-                  <a:ea typeface="+mn-ea"/>
-                  <a:cs typeface="+mn-cs"/>
-                </a:defRPr>
-              </a:lvl3pPr>
-              <a:lvl4pPr marL="1371600" algn="l" defTabSz="914400" rtl="0" eaLnBrk="1" latinLnBrk="0" hangingPunct="1">
-                <a:defRPr sz="1800" kern="1200">
-                  <a:solidFill>
-                    <a:schemeClr val="lt1"/>
-                  </a:solidFill>
-                  <a:latin typeface="+mn-lt"/>
-                  <a:ea typeface="+mn-ea"/>
-                  <a:cs typeface="+mn-cs"/>
-                </a:defRPr>
-              </a:lvl4pPr>
-              <a:lvl5pPr marL="1828800" algn="l" defTabSz="914400" rtl="0" eaLnBrk="1" latinLnBrk="0" hangingPunct="1">
-                <a:defRPr sz="1800" kern="1200">
-                  <a:solidFill>
-                    <a:schemeClr val="lt1"/>
-                  </a:solidFill>
-                  <a:latin typeface="+mn-lt"/>
-                  <a:ea typeface="+mn-ea"/>
-                  <a:cs typeface="+mn-cs"/>
-                </a:defRPr>
-              </a:lvl5pPr>
-              <a:lvl6pPr marL="2286000" algn="l" defTabSz="914400" rtl="0" eaLnBrk="1" latinLnBrk="0" hangingPunct="1">
-                <a:defRPr sz="1800" kern="1200">
-                  <a:solidFill>
-                    <a:schemeClr val="lt1"/>
-                  </a:solidFill>
-                  <a:latin typeface="+mn-lt"/>
-                  <a:ea typeface="+mn-ea"/>
-                  <a:cs typeface="+mn-cs"/>
-                </a:defRPr>
-              </a:lvl6pPr>
-              <a:lvl7pPr marL="2743200" algn="l" defTabSz="914400" rtl="0" eaLnBrk="1" latinLnBrk="0" hangingPunct="1">
-                <a:defRPr sz="1800" kern="1200">
-                  <a:solidFill>
-                    <a:schemeClr val="lt1"/>
-                  </a:solidFill>
-                  <a:latin typeface="+mn-lt"/>
-                  <a:ea typeface="+mn-ea"/>
-                  <a:cs typeface="+mn-cs"/>
-                </a:defRPr>
-              </a:lvl7pPr>
-              <a:lvl8pPr marL="3200400" algn="l" defTabSz="914400" rtl="0" eaLnBrk="1" latinLnBrk="0" hangingPunct="1">
-                <a:defRPr sz="1800" kern="1200">
-                  <a:solidFill>
-                    <a:schemeClr val="lt1"/>
-                  </a:solidFill>
-                  <a:latin typeface="+mn-lt"/>
-                  <a:ea typeface="+mn-ea"/>
-                  <a:cs typeface="+mn-cs"/>
-                </a:defRPr>
-              </a:lvl8pPr>
-              <a:lvl9pPr marL="3657600" algn="l" defTabSz="914400" rtl="0" eaLnBrk="1" latinLnBrk="0" hangingPunct="1">
-                <a:defRPr sz="1800" kern="1200">
-                  <a:solidFill>
-                    <a:schemeClr val="lt1"/>
-                  </a:solidFill>
-                  <a:latin typeface="+mn-lt"/>
-                  <a:ea typeface="+mn-ea"/>
-                  <a:cs typeface="+mn-cs"/>
-                </a:defRPr>
-              </a:lvl9pPr>
-            </a:lstStyle>
-            <a:p>
-              <a:pPr lvl="0" algn="ctr">
-                <a:defRPr/>
-              </a:pPr>
-              <a:endParaRPr lang="en-US" sz="300" noProof="1">
-                <a:solidFill>
-                  <a:prstClr val="black">
-                    <a:lumMod val="65000"/>
-                    <a:lumOff val="35000"/>
-                  </a:prstClr>
-                </a:solidFill>
-                <a:latin typeface="Calibri" panose="020F0502020204030204"/>
-              </a:endParaRPr>
-            </a:p>
-            <a:p>
-              <a:pPr lvl="0" algn="ctr">
-                <a:defRPr/>
-              </a:pPr>
-              <a:endParaRPr kumimoji="0" lang="en-US" sz="300" b="0" i="0" u="none" strike="noStrike" kern="1200" cap="none" spc="0" normalizeH="0" baseline="0" noProof="1">
-                <a:ln>
-                  <a:noFill/>
-                </a:ln>
-                <a:solidFill>
-                  <a:prstClr val="black">
-                    <a:lumMod val="65000"/>
-                    <a:lumOff val="35000"/>
-                  </a:prstClr>
-                </a:solidFill>
-                <a:effectLst/>
-                <a:uLnTx/>
-                <a:uFillTx/>
-                <a:latin typeface="Calibri" panose="020F0502020204030204"/>
-                <a:ea typeface="+mn-ea"/>
-                <a:cs typeface="+mn-cs"/>
-              </a:endParaRPr>
-            </a:p>
-            <a:p>
-              <a:pPr lvl="0" algn="ctr">
-                <a:defRPr/>
-              </a:pPr>
-              <a:r>
-                <a:rPr lang="en-US" sz="1400" noProof="1">
-                  <a:solidFill>
-                    <a:prstClr val="black">
-                      <a:lumMod val="65000"/>
-                      <a:lumOff val="35000"/>
-                    </a:prstClr>
-                  </a:solidFill>
-                  <a:latin typeface="Calibri" panose="020F0502020204030204"/>
-                </a:rPr>
-                <a:t>Although all loyalty programs grew in the past</a:t>
-              </a:r>
-              <a:r>
-                <a:rPr lang="en-GB" sz="1400" noProof="1">
-                  <a:solidFill>
-                    <a:prstClr val="black">
-                      <a:lumMod val="65000"/>
-                      <a:lumOff val="35000"/>
-                    </a:prstClr>
-                  </a:solidFill>
-                  <a:latin typeface="Calibri" panose="020F0502020204030204"/>
-                </a:rPr>
-                <a:t>, their </a:t>
-              </a:r>
-              <a:r>
-                <a:rPr lang="en-GB" sz="1400" b="1" noProof="1">
-                  <a:solidFill>
-                    <a:prstClr val="black">
-                      <a:lumMod val="65000"/>
-                      <a:lumOff val="35000"/>
-                    </a:prstClr>
-                  </a:solidFill>
-                  <a:latin typeface="Calibri" panose="020F0502020204030204"/>
-                </a:rPr>
-                <a:t>customers’ lifetime values </a:t>
-              </a:r>
-              <a:r>
-                <a:rPr lang="en-US" sz="1400" b="1" noProof="1">
-                  <a:solidFill>
-                    <a:prstClr val="black">
-                      <a:lumMod val="65000"/>
-                      <a:lumOff val="35000"/>
-                    </a:prstClr>
-                  </a:solidFill>
-                  <a:latin typeface="Calibri" panose="020F0502020204030204"/>
-                </a:rPr>
-                <a:t>remained constant</a:t>
-              </a:r>
-              <a:r>
-                <a:rPr lang="en-US" sz="1400" noProof="1">
-                  <a:solidFill>
-                    <a:prstClr val="black">
-                      <a:lumMod val="65000"/>
-                      <a:lumOff val="35000"/>
-                    </a:prstClr>
-                  </a:solidFill>
-                  <a:latin typeface="Calibri" panose="020F0502020204030204"/>
-                </a:rPr>
-                <a:t>. This suggests that the customer acquisition is not targeted towards finding the most profitable clients.</a:t>
-              </a:r>
-              <a:endParaRPr kumimoji="0" lang="en-US" sz="1400" b="0" i="0" u="none" strike="noStrike" kern="1200" cap="none" spc="0" normalizeH="0" baseline="0" noProof="1">
-                <a:ln>
-                  <a:noFill/>
-                </a:ln>
-                <a:solidFill>
-                  <a:prstClr val="black">
-                    <a:lumMod val="65000"/>
-                    <a:lumOff val="35000"/>
-                  </a:prstClr>
-                </a:solidFill>
-                <a:effectLst/>
-                <a:uLnTx/>
-                <a:uFillTx/>
-                <a:latin typeface="Calibri" panose="020F0502020204030204"/>
-                <a:ea typeface="+mn-ea"/>
-                <a:cs typeface="+mn-cs"/>
-              </a:endParaRPr>
-            </a:p>
-          </p:txBody>
-        </p:sp>
-        <p:sp>
-          <p:nvSpPr>
-            <p:cNvPr id="45" name="Freeform: Shape 44">
-              <a:extLst>
-                <a:ext uri="{FF2B5EF4-FFF2-40B4-BE49-F238E27FC236}">
-                  <a16:creationId xmlns:a16="http://schemas.microsoft.com/office/drawing/2014/main" id="{B3DC6946-BFF3-2BDE-80E7-6391C98321C6}"/>
-                </a:ext>
-              </a:extLst>
-            </p:cNvPr>
-            <p:cNvSpPr/>
-            <p:nvPr/>
-          </p:nvSpPr>
-          <p:spPr>
-            <a:xfrm>
-              <a:off x="1094949" y="3036178"/>
-              <a:ext cx="3046538" cy="331361"/>
-            </a:xfrm>
-            <a:custGeom>
-              <a:avLst/>
-              <a:gdLst>
-                <a:gd name="connsiteX0" fmla="*/ 351094 w 3046538"/>
-                <a:gd name="connsiteY0" fmla="*/ 0 h 331361"/>
-                <a:gd name="connsiteX1" fmla="*/ 2683799 w 3046538"/>
-                <a:gd name="connsiteY1" fmla="*/ 0 h 331361"/>
-                <a:gd name="connsiteX2" fmla="*/ 2743299 w 3046538"/>
-                <a:gd name="connsiteY2" fmla="*/ 12013 h 331361"/>
-                <a:gd name="connsiteX3" fmla="*/ 2743789 w 3046538"/>
-                <a:gd name="connsiteY3" fmla="*/ 12343 h 331361"/>
-                <a:gd name="connsiteX4" fmla="*/ 2747886 w 3046538"/>
-                <a:gd name="connsiteY4" fmla="*/ 13140 h 331361"/>
-                <a:gd name="connsiteX5" fmla="*/ 2802334 w 3046538"/>
-                <a:gd name="connsiteY5" fmla="*/ 49296 h 331361"/>
-                <a:gd name="connsiteX6" fmla="*/ 3046538 w 3046538"/>
-                <a:gd name="connsiteY6" fmla="*/ 165680 h 331361"/>
-                <a:gd name="connsiteX7" fmla="*/ 2802334 w 3046538"/>
-                <a:gd name="connsiteY7" fmla="*/ 282064 h 331361"/>
-                <a:gd name="connsiteX8" fmla="*/ 2747886 w 3046538"/>
-                <a:gd name="connsiteY8" fmla="*/ 318220 h 331361"/>
-                <a:gd name="connsiteX9" fmla="*/ 2743791 w 3046538"/>
-                <a:gd name="connsiteY9" fmla="*/ 319017 h 331361"/>
-                <a:gd name="connsiteX10" fmla="*/ 2743299 w 3046538"/>
-                <a:gd name="connsiteY10" fmla="*/ 319349 h 331361"/>
-                <a:gd name="connsiteX11" fmla="*/ 2683799 w 3046538"/>
-                <a:gd name="connsiteY11" fmla="*/ 331361 h 331361"/>
-                <a:gd name="connsiteX12" fmla="*/ 351094 w 3046538"/>
-                <a:gd name="connsiteY12" fmla="*/ 331361 h 331361"/>
-                <a:gd name="connsiteX13" fmla="*/ 243006 w 3046538"/>
-                <a:gd name="connsiteY13" fmla="*/ 286589 h 331361"/>
-                <a:gd name="connsiteX14" fmla="*/ 193128 w 3046538"/>
-                <a:gd name="connsiteY14" fmla="*/ 241208 h 331361"/>
-                <a:gd name="connsiteX15" fmla="*/ 0 w 3046538"/>
-                <a:gd name="connsiteY15" fmla="*/ 165680 h 331361"/>
-                <a:gd name="connsiteX16" fmla="*/ 193128 w 3046538"/>
-                <a:gd name="connsiteY16" fmla="*/ 90152 h 331361"/>
-                <a:gd name="connsiteX17" fmla="*/ 237522 w 3046538"/>
-                <a:gd name="connsiteY17" fmla="*/ 52906 h 331361"/>
-                <a:gd name="connsiteX18" fmla="*/ 243006 w 3046538"/>
-                <a:gd name="connsiteY18" fmla="*/ 44772 h 331361"/>
-                <a:gd name="connsiteX19" fmla="*/ 351094 w 3046538"/>
-                <a:gd name="connsiteY19" fmla="*/ 0 h 331361"/>
-                <a:gd name="connsiteX0" fmla="*/ 351094 w 3046538"/>
-                <a:gd name="connsiteY0" fmla="*/ 0 h 331361"/>
-                <a:gd name="connsiteX1" fmla="*/ 2683799 w 3046538"/>
-                <a:gd name="connsiteY1" fmla="*/ 0 h 331361"/>
-                <a:gd name="connsiteX2" fmla="*/ 2743299 w 3046538"/>
-                <a:gd name="connsiteY2" fmla="*/ 12013 h 331361"/>
-                <a:gd name="connsiteX3" fmla="*/ 2743789 w 3046538"/>
-                <a:gd name="connsiteY3" fmla="*/ 12343 h 331361"/>
-                <a:gd name="connsiteX4" fmla="*/ 2747886 w 3046538"/>
-                <a:gd name="connsiteY4" fmla="*/ 13140 h 331361"/>
-                <a:gd name="connsiteX5" fmla="*/ 2802334 w 3046538"/>
-                <a:gd name="connsiteY5" fmla="*/ 49296 h 331361"/>
-                <a:gd name="connsiteX6" fmla="*/ 3046538 w 3046538"/>
-                <a:gd name="connsiteY6" fmla="*/ 165680 h 331361"/>
-                <a:gd name="connsiteX7" fmla="*/ 2802334 w 3046538"/>
-                <a:gd name="connsiteY7" fmla="*/ 282064 h 331361"/>
-                <a:gd name="connsiteX8" fmla="*/ 2747886 w 3046538"/>
-                <a:gd name="connsiteY8" fmla="*/ 318220 h 331361"/>
-                <a:gd name="connsiteX9" fmla="*/ 2743791 w 3046538"/>
-                <a:gd name="connsiteY9" fmla="*/ 319017 h 331361"/>
-                <a:gd name="connsiteX10" fmla="*/ 2743299 w 3046538"/>
-                <a:gd name="connsiteY10" fmla="*/ 319349 h 331361"/>
-                <a:gd name="connsiteX11" fmla="*/ 2683799 w 3046538"/>
-                <a:gd name="connsiteY11" fmla="*/ 331361 h 331361"/>
-                <a:gd name="connsiteX12" fmla="*/ 351094 w 3046538"/>
-                <a:gd name="connsiteY12" fmla="*/ 331361 h 331361"/>
-                <a:gd name="connsiteX13" fmla="*/ 243006 w 3046538"/>
-                <a:gd name="connsiteY13" fmla="*/ 286589 h 331361"/>
-                <a:gd name="connsiteX14" fmla="*/ 193128 w 3046538"/>
-                <a:gd name="connsiteY14" fmla="*/ 241208 h 331361"/>
-                <a:gd name="connsiteX15" fmla="*/ 0 w 3046538"/>
-                <a:gd name="connsiteY15" fmla="*/ 165680 h 331361"/>
-                <a:gd name="connsiteX16" fmla="*/ 193128 w 3046538"/>
-                <a:gd name="connsiteY16" fmla="*/ 90152 h 331361"/>
-                <a:gd name="connsiteX17" fmla="*/ 243006 w 3046538"/>
-                <a:gd name="connsiteY17" fmla="*/ 44772 h 331361"/>
-                <a:gd name="connsiteX18" fmla="*/ 351094 w 3046538"/>
-                <a:gd name="connsiteY18" fmla="*/ 0 h 331361"/>
-              </a:gdLst>
-              <a:ahLst/>
-              <a:cxnLst>
-                <a:cxn ang="0">
-                  <a:pos x="connsiteX0" y="connsiteY0"/>
-                </a:cxn>
-                <a:cxn ang="0">
-                  <a:pos x="connsiteX1" y="connsiteY1"/>
-                </a:cxn>
-                <a:cxn ang="0">
-                  <a:pos x="connsiteX2" y="connsiteY2"/>
-                </a:cxn>
-                <a:cxn ang="0">
-                  <a:pos x="connsiteX3" y="connsiteY3"/>
-                </a:cxn>
-                <a:cxn ang="0">
-                  <a:pos x="connsiteX4" y="connsiteY4"/>
-                </a:cxn>
-                <a:cxn ang="0">
-                  <a:pos x="connsiteX5" y="connsiteY5"/>
-                </a:cxn>
-                <a:cxn ang="0">
-                  <a:pos x="connsiteX6" y="connsiteY6"/>
-                </a:cxn>
-                <a:cxn ang="0">
-                  <a:pos x="connsiteX7" y="connsiteY7"/>
-                </a:cxn>
-                <a:cxn ang="0">
-                  <a:pos x="connsiteX8" y="connsiteY8"/>
-                </a:cxn>
-                <a:cxn ang="0">
-                  <a:pos x="connsiteX9" y="connsiteY9"/>
-                </a:cxn>
-                <a:cxn ang="0">
-                  <a:pos x="connsiteX10" y="connsiteY10"/>
-                </a:cxn>
-                <a:cxn ang="0">
-                  <a:pos x="connsiteX11" y="connsiteY11"/>
-                </a:cxn>
-                <a:cxn ang="0">
-                  <a:pos x="connsiteX12" y="connsiteY12"/>
-                </a:cxn>
-                <a:cxn ang="0">
-                  <a:pos x="connsiteX13" y="connsiteY13"/>
-                </a:cxn>
-                <a:cxn ang="0">
-                  <a:pos x="connsiteX14" y="connsiteY14"/>
-                </a:cxn>
-                <a:cxn ang="0">
-                  <a:pos x="connsiteX15" y="connsiteY15"/>
-                </a:cxn>
-                <a:cxn ang="0">
-                  <a:pos x="connsiteX16" y="connsiteY16"/>
-                </a:cxn>
-                <a:cxn ang="0">
-                  <a:pos x="connsiteX17" y="connsiteY17"/>
-                </a:cxn>
-                <a:cxn ang="0">
-                  <a:pos x="connsiteX18" y="connsiteY18"/>
-                </a:cxn>
-              </a:cxnLst>
-              <a:rect l="l" t="t" r="r" b="b"/>
-              <a:pathLst>
-                <a:path w="3046538" h="331361">
-                  <a:moveTo>
-                    <a:pt x="351094" y="0"/>
-                  </a:moveTo>
-                  <a:lnTo>
-                    <a:pt x="2683799" y="0"/>
-                  </a:lnTo>
-                  <a:cubicBezTo>
-                    <a:pt x="2704905" y="0"/>
-                    <a:pt x="2725011" y="4278"/>
-                    <a:pt x="2743299" y="12013"/>
-                  </a:cubicBezTo>
-                  <a:lnTo>
-                    <a:pt x="2743789" y="12343"/>
-                  </a:lnTo>
-                  <a:lnTo>
-                    <a:pt x="2747886" y="13140"/>
-                  </a:lnTo>
-                  <a:cubicBezTo>
-                    <a:pt x="2767699" y="21175"/>
-                    <a:pt x="2786265" y="33227"/>
-                    <a:pt x="2802334" y="49296"/>
-                  </a:cubicBezTo>
-                  <a:cubicBezTo>
-                    <a:pt x="2862432" y="109394"/>
-                    <a:pt x="2943833" y="148189"/>
-                    <a:pt x="3046538" y="165680"/>
-                  </a:cubicBezTo>
-                  <a:cubicBezTo>
-                    <a:pt x="2943833" y="183171"/>
-                    <a:pt x="2862432" y="221967"/>
-                    <a:pt x="2802334" y="282064"/>
-                  </a:cubicBezTo>
-                  <a:cubicBezTo>
-                    <a:pt x="2786265" y="298133"/>
-                    <a:pt x="2767699" y="310186"/>
-                    <a:pt x="2747886" y="318220"/>
-                  </a:cubicBezTo>
-                  <a:lnTo>
-                    <a:pt x="2743791" y="319017"/>
-                  </a:lnTo>
-                  <a:lnTo>
-                    <a:pt x="2743299" y="319349"/>
-                  </a:lnTo>
-                  <a:cubicBezTo>
-                    <a:pt x="2725011" y="327084"/>
-                    <a:pt x="2704905" y="331361"/>
-                    <a:pt x="2683799" y="331361"/>
-                  </a:cubicBezTo>
-                  <a:lnTo>
-                    <a:pt x="351094" y="331361"/>
-                  </a:lnTo>
-                  <a:cubicBezTo>
-                    <a:pt x="308883" y="331361"/>
-                    <a:pt x="270668" y="314252"/>
-                    <a:pt x="243006" y="286589"/>
-                  </a:cubicBezTo>
-                  <a:lnTo>
-                    <a:pt x="193128" y="241208"/>
-                  </a:lnTo>
-                  <a:cubicBezTo>
-                    <a:pt x="140512" y="204273"/>
-                    <a:pt x="76137" y="179097"/>
-                    <a:pt x="0" y="165680"/>
-                  </a:cubicBezTo>
-                  <a:cubicBezTo>
-                    <a:pt x="76137" y="152264"/>
-                    <a:pt x="140512" y="127088"/>
-                    <a:pt x="193128" y="90152"/>
-                  </a:cubicBezTo>
-                  <a:lnTo>
-                    <a:pt x="243006" y="44772"/>
-                  </a:lnTo>
-                  <a:cubicBezTo>
-                    <a:pt x="270668" y="17110"/>
-                    <a:pt x="308883" y="0"/>
-                    <a:pt x="351094" y="0"/>
-                  </a:cubicBezTo>
-                  <a:close/>
-                </a:path>
-              </a:pathLst>
-            </a:custGeom>
-            <a:solidFill>
-              <a:srgbClr val="CACCCC"/>
-            </a:solidFill>
-            <a:ln>
-              <a:solidFill>
-                <a:srgbClr val="CACCCC"/>
-              </a:solidFill>
-            </a:ln>
-          </p:spPr>
-          <p:style>
-            <a:lnRef idx="2">
-              <a:schemeClr val="accent1">
-                <a:shade val="50000"/>
-              </a:schemeClr>
-            </a:lnRef>
-            <a:fillRef idx="1">
-              <a:schemeClr val="accent1"/>
-            </a:fillRef>
-            <a:effectRef idx="0">
-              <a:schemeClr val="accent1"/>
-            </a:effectRef>
-            <a:fontRef idx="minor">
-              <a:schemeClr val="lt1"/>
-            </a:fontRef>
-          </p:style>
-          <p:txBody>
-            <a:bodyPr wrap="square" rtlCol="0" anchor="ctr">
-              <a:noAutofit/>
-            </a:bodyPr>
-            <a:lstStyle>
-              <a:defPPr>
-                <a:defRPr lang="en-US"/>
-              </a:defPPr>
-              <a:lvl1pPr marL="0" algn="l" defTabSz="914400" rtl="0" eaLnBrk="1" latinLnBrk="0" hangingPunct="1">
-                <a:defRPr sz="1800" kern="1200">
-                  <a:solidFill>
-                    <a:schemeClr val="lt1"/>
-                  </a:solidFill>
-                  <a:latin typeface="+mn-lt"/>
-                  <a:ea typeface="+mn-ea"/>
-                  <a:cs typeface="+mn-cs"/>
-                </a:defRPr>
-              </a:lvl1pPr>
-              <a:lvl2pPr marL="457200" algn="l" defTabSz="914400" rtl="0" eaLnBrk="1" latinLnBrk="0" hangingPunct="1">
-                <a:defRPr sz="1800" kern="1200">
-                  <a:solidFill>
-                    <a:schemeClr val="lt1"/>
-                  </a:solidFill>
-                  <a:latin typeface="+mn-lt"/>
-                  <a:ea typeface="+mn-ea"/>
-                  <a:cs typeface="+mn-cs"/>
-                </a:defRPr>
-              </a:lvl2pPr>
-              <a:lvl3pPr marL="914400" algn="l" defTabSz="914400" rtl="0" eaLnBrk="1" latinLnBrk="0" hangingPunct="1">
-                <a:defRPr sz="1800" kern="1200">
-                  <a:solidFill>
-                    <a:schemeClr val="lt1"/>
-                  </a:solidFill>
-                  <a:latin typeface="+mn-lt"/>
-                  <a:ea typeface="+mn-ea"/>
-                  <a:cs typeface="+mn-cs"/>
-                </a:defRPr>
-              </a:lvl3pPr>
-              <a:lvl4pPr marL="1371600" algn="l" defTabSz="914400" rtl="0" eaLnBrk="1" latinLnBrk="0" hangingPunct="1">
-                <a:defRPr sz="1800" kern="1200">
-                  <a:solidFill>
-                    <a:schemeClr val="lt1"/>
-                  </a:solidFill>
-                  <a:latin typeface="+mn-lt"/>
-                  <a:ea typeface="+mn-ea"/>
-                  <a:cs typeface="+mn-cs"/>
-                </a:defRPr>
-              </a:lvl4pPr>
-              <a:lvl5pPr marL="1828800" algn="l" defTabSz="914400" rtl="0" eaLnBrk="1" latinLnBrk="0" hangingPunct="1">
-                <a:defRPr sz="1800" kern="1200">
-                  <a:solidFill>
-                    <a:schemeClr val="lt1"/>
-                  </a:solidFill>
-                  <a:latin typeface="+mn-lt"/>
-                  <a:ea typeface="+mn-ea"/>
-                  <a:cs typeface="+mn-cs"/>
-                </a:defRPr>
-              </a:lvl5pPr>
-              <a:lvl6pPr marL="2286000" algn="l" defTabSz="914400" rtl="0" eaLnBrk="1" latinLnBrk="0" hangingPunct="1">
-                <a:defRPr sz="1800" kern="1200">
-                  <a:solidFill>
-                    <a:schemeClr val="lt1"/>
-                  </a:solidFill>
-                  <a:latin typeface="+mn-lt"/>
-                  <a:ea typeface="+mn-ea"/>
-                  <a:cs typeface="+mn-cs"/>
-                </a:defRPr>
-              </a:lvl6pPr>
-              <a:lvl7pPr marL="2743200" algn="l" defTabSz="914400" rtl="0" eaLnBrk="1" latinLnBrk="0" hangingPunct="1">
-                <a:defRPr sz="1800" kern="1200">
-                  <a:solidFill>
-                    <a:schemeClr val="lt1"/>
-                  </a:solidFill>
-                  <a:latin typeface="+mn-lt"/>
-                  <a:ea typeface="+mn-ea"/>
-                  <a:cs typeface="+mn-cs"/>
-                </a:defRPr>
-              </a:lvl7pPr>
-              <a:lvl8pPr marL="3200400" algn="l" defTabSz="914400" rtl="0" eaLnBrk="1" latinLnBrk="0" hangingPunct="1">
-                <a:defRPr sz="1800" kern="1200">
-                  <a:solidFill>
-                    <a:schemeClr val="lt1"/>
-                  </a:solidFill>
-                  <a:latin typeface="+mn-lt"/>
-                  <a:ea typeface="+mn-ea"/>
-                  <a:cs typeface="+mn-cs"/>
-                </a:defRPr>
-              </a:lvl8pPr>
-              <a:lvl9pPr marL="3657600" algn="l" defTabSz="914400" rtl="0" eaLnBrk="1" latinLnBrk="0" hangingPunct="1">
-                <a:defRPr sz="1800" kern="1200">
-                  <a:solidFill>
-                    <a:schemeClr val="lt1"/>
-                  </a:solidFill>
-                  <a:latin typeface="+mn-lt"/>
-                  <a:ea typeface="+mn-ea"/>
-                  <a:cs typeface="+mn-cs"/>
-                </a:defRPr>
-              </a:lvl9pPr>
-            </a:lstStyle>
-            <a:p>
-              <a:pPr algn="ctr"/>
-              <a:r>
-                <a:rPr lang="en-US" b="1" dirty="0">
-                  <a:solidFill>
-                    <a:schemeClr val="tx1"/>
-                  </a:solidFill>
-                </a:rPr>
-                <a:t>Remarks</a:t>
-              </a:r>
-            </a:p>
-          </p:txBody>
-        </p:sp>
-      </p:grpSp>
-      <p:sp>
-        <p:nvSpPr>
-          <p:cNvPr id="47" name="TextBox 46">
-            <a:extLst>
-              <a:ext uri="{FF2B5EF4-FFF2-40B4-BE49-F238E27FC236}">
-                <a16:creationId xmlns:a16="http://schemas.microsoft.com/office/drawing/2014/main" id="{0F128D12-7E43-D242-FC2C-2CE65A2D9C35}"/>
-              </a:ext>
-            </a:extLst>
-          </p:cNvPr>
-          <p:cNvSpPr txBox="1"/>
-          <p:nvPr/>
-        </p:nvSpPr>
-        <p:spPr>
-          <a:xfrm>
-            <a:off x="5709945" y="10524679"/>
-            <a:ext cx="3823718" cy="1200329"/>
-          </a:xfrm>
-          <a:prstGeom prst="rect">
-            <a:avLst/>
-          </a:prstGeom>
-          <a:noFill/>
-        </p:spPr>
-        <p:txBody>
-          <a:bodyPr wrap="square" rtlCol="0">
-            <a:spAutoFit/>
-          </a:bodyPr>
-          <a:lstStyle/>
-          <a:p>
-            <a:r>
-              <a:rPr lang="en-GB" dirty="0"/>
-              <a:t>Consider different geographical features, such as hub development and customer density, for marketing campaigns</a:t>
-            </a:r>
-          </a:p>
-        </p:txBody>
-      </p:sp>
-      <p:pic>
-        <p:nvPicPr>
-          <p:cNvPr id="49" name="Picture 48">
-            <a:extLst>
-              <a:ext uri="{FF2B5EF4-FFF2-40B4-BE49-F238E27FC236}">
-                <a16:creationId xmlns:a16="http://schemas.microsoft.com/office/drawing/2014/main" id="{46578C63-7E4B-6C27-17DF-C176E8084B24}"/>
-              </a:ext>
-            </a:extLst>
-          </p:cNvPr>
-          <p:cNvPicPr>
-            <a:picLocks noChangeAspect="1"/>
-          </p:cNvPicPr>
-          <p:nvPr/>
-        </p:nvPicPr>
-        <p:blipFill>
-          <a:blip r:embed="rId3"/>
-          <a:stretch>
-            <a:fillRect/>
-          </a:stretch>
-        </p:blipFill>
-        <p:spPr>
-          <a:xfrm>
-            <a:off x="5026344" y="8485115"/>
-            <a:ext cx="684000" cy="684000"/>
-          </a:xfrm>
-          <a:prstGeom prst="rect">
-            <a:avLst/>
-          </a:prstGeom>
-        </p:spPr>
-      </p:pic>
-      <p:pic>
-        <p:nvPicPr>
-          <p:cNvPr id="53" name="Picture 52">
-            <a:extLst>
-              <a:ext uri="{FF2B5EF4-FFF2-40B4-BE49-F238E27FC236}">
-                <a16:creationId xmlns:a16="http://schemas.microsoft.com/office/drawing/2014/main" id="{1F062A79-C322-526C-1E17-F61F980116DC}"/>
-              </a:ext>
-            </a:extLst>
-          </p:cNvPr>
-          <p:cNvPicPr>
-            <a:picLocks noChangeAspect="1"/>
-          </p:cNvPicPr>
-          <p:nvPr/>
-        </p:nvPicPr>
-        <p:blipFill>
-          <a:blip r:embed="rId4"/>
-          <a:stretch>
-            <a:fillRect/>
-          </a:stretch>
-        </p:blipFill>
-        <p:spPr>
-          <a:xfrm>
-            <a:off x="5026344" y="9451065"/>
-            <a:ext cx="684000" cy="684000"/>
-          </a:xfrm>
-          <a:prstGeom prst="rect">
-            <a:avLst/>
-          </a:prstGeom>
-        </p:spPr>
-      </p:pic>
-      <p:pic>
-        <p:nvPicPr>
-          <p:cNvPr id="55" name="Picture 54">
-            <a:extLst>
-              <a:ext uri="{FF2B5EF4-FFF2-40B4-BE49-F238E27FC236}">
-                <a16:creationId xmlns:a16="http://schemas.microsoft.com/office/drawing/2014/main" id="{EB9A72F7-5CB9-5C2C-80F2-DD7997F133EE}"/>
-              </a:ext>
-            </a:extLst>
-          </p:cNvPr>
-          <p:cNvPicPr>
-            <a:picLocks noChangeAspect="1"/>
-          </p:cNvPicPr>
-          <p:nvPr/>
-        </p:nvPicPr>
-        <p:blipFill>
-          <a:blip r:embed="rId5"/>
-          <a:stretch>
-            <a:fillRect/>
-          </a:stretch>
-        </p:blipFill>
-        <p:spPr>
-          <a:xfrm>
-            <a:off x="5026344" y="10782843"/>
-            <a:ext cx="684000" cy="684000"/>
-          </a:xfrm>
-          <a:prstGeom prst="rect">
-            <a:avLst/>
-          </a:prstGeom>
-        </p:spPr>
-      </p:pic>
-      <p:sp>
-        <p:nvSpPr>
-          <p:cNvPr id="60" name="Rectangle 59">
-            <a:extLst>
-              <a:ext uri="{FF2B5EF4-FFF2-40B4-BE49-F238E27FC236}">
-                <a16:creationId xmlns:a16="http://schemas.microsoft.com/office/drawing/2014/main" id="{9514EE16-4E24-5469-01B8-C3F6F17BF9CA}"/>
-              </a:ext>
-            </a:extLst>
-          </p:cNvPr>
-          <p:cNvSpPr/>
-          <p:nvPr/>
-        </p:nvSpPr>
-        <p:spPr>
-          <a:xfrm>
-            <a:off x="1753" y="12473035"/>
-            <a:ext cx="9601200" cy="345853"/>
-          </a:xfrm>
-          <a:prstGeom prst="rect">
-            <a:avLst/>
-          </a:prstGeom>
-          <a:solidFill>
-            <a:schemeClr val="accent2"/>
-          </a:solidFill>
-          <a:ln>
-            <a:noFill/>
-          </a:ln>
-        </p:spPr>
-        <p:style>
-          <a:lnRef idx="2">
-            <a:schemeClr val="accent1">
-              <a:shade val="15000"/>
-            </a:schemeClr>
-          </a:lnRef>
-          <a:fillRef idx="1">
-            <a:schemeClr val="accent1"/>
-          </a:fillRef>
-          <a:effectRef idx="0">
-            <a:schemeClr val="accent1"/>
-          </a:effectRef>
-          <a:fontRef idx="minor">
-            <a:schemeClr val="lt1"/>
-          </a:fontRef>
-        </p:style>
-        <p:txBody>
-          <a:bodyPr rtlCol="0" anchor="ctr"/>
-          <a:lstStyle/>
-          <a:p>
-            <a:pPr algn="ctr"/>
-            <a:endParaRPr lang="en-AT" sz="4000" b="1" dirty="0"/>
-          </a:p>
-        </p:txBody>
-      </p:sp>
-      <p:sp>
-        <p:nvSpPr>
-          <p:cNvPr id="29" name="TextBox 28">
-            <a:extLst>
-              <a:ext uri="{FF2B5EF4-FFF2-40B4-BE49-F238E27FC236}">
-                <a16:creationId xmlns:a16="http://schemas.microsoft.com/office/drawing/2014/main" id="{82524889-3897-7478-4E6C-25CE8BA6FCB2}"/>
-              </a:ext>
-            </a:extLst>
-          </p:cNvPr>
-          <p:cNvSpPr txBox="1"/>
-          <p:nvPr/>
-        </p:nvSpPr>
-        <p:spPr>
-          <a:xfrm>
-            <a:off x="5709945" y="8503950"/>
-            <a:ext cx="3823718" cy="646331"/>
-          </a:xfrm>
-          <a:prstGeom prst="rect">
-            <a:avLst/>
-          </a:prstGeom>
-          <a:noFill/>
-        </p:spPr>
-        <p:txBody>
-          <a:bodyPr wrap="square">
-            <a:spAutoFit/>
-          </a:bodyPr>
-          <a:lstStyle/>
-          <a:p>
-            <a:r>
-              <a:rPr lang="en-GB" dirty="0"/>
-              <a:t>Based on Recency, Frequency, and Monetary value</a:t>
-            </a:r>
-          </a:p>
-        </p:txBody>
-      </p:sp>
-      <p:sp>
-        <p:nvSpPr>
-          <p:cNvPr id="31" name="TextBox 30">
-            <a:extLst>
-              <a:ext uri="{FF2B5EF4-FFF2-40B4-BE49-F238E27FC236}">
-                <a16:creationId xmlns:a16="http://schemas.microsoft.com/office/drawing/2014/main" id="{92E3E0E4-B043-569D-F296-F69E31F42B60}"/>
-              </a:ext>
-            </a:extLst>
-          </p:cNvPr>
-          <p:cNvSpPr txBox="1"/>
-          <p:nvPr/>
-        </p:nvSpPr>
-        <p:spPr>
-          <a:xfrm>
-            <a:off x="5709945" y="9331400"/>
-            <a:ext cx="3823718" cy="923330"/>
-          </a:xfrm>
-          <a:prstGeom prst="rect">
-            <a:avLst/>
-          </a:prstGeom>
-          <a:noFill/>
-        </p:spPr>
-        <p:txBody>
-          <a:bodyPr wrap="square">
-            <a:spAutoFit/>
-          </a:bodyPr>
-          <a:lstStyle/>
-          <a:p>
-            <a:r>
-              <a:rPr lang="en-GB" dirty="0"/>
-              <a:t>Refine segments by points redemption rates to fine-tune for the most profitable customers</a:t>
-            </a:r>
-          </a:p>
-        </p:txBody>
-      </p:sp>
-      <p:pic>
-        <p:nvPicPr>
-          <p:cNvPr id="33" name="Graphic 32">
-            <a:extLst>
-              <a:ext uri="{FF2B5EF4-FFF2-40B4-BE49-F238E27FC236}">
-                <a16:creationId xmlns:a16="http://schemas.microsoft.com/office/drawing/2014/main" id="{027C630D-E0D3-A2DD-D5C5-3AB52B9E5EB5}"/>
-              </a:ext>
-            </a:extLst>
-          </p:cNvPr>
-          <p:cNvPicPr>
-            <a:picLocks noChangeAspect="1"/>
-          </p:cNvPicPr>
-          <p:nvPr/>
-        </p:nvPicPr>
-        <p:blipFill>
-          <a:blip r:embed="rId6">
-            <a:extLst>
-              <a:ext uri="{96DAC541-7B7A-43D3-8B79-37D633B846F1}">
-                <asvg:svgBlip xmlns:asvg="http://schemas.microsoft.com/office/drawing/2016/SVG/main" r:embed="rId7"/>
-              </a:ext>
-            </a:extLst>
-          </a:blip>
-          <a:stretch>
-            <a:fillRect/>
-          </a:stretch>
-        </p:blipFill>
-        <p:spPr>
-          <a:xfrm>
-            <a:off x="473866" y="8302261"/>
-            <a:ext cx="3778908" cy="2519272"/>
-          </a:xfrm>
-          <a:prstGeom prst="rect">
-            <a:avLst/>
-          </a:prstGeom>
-        </p:spPr>
-      </p:pic>
-      <p:pic>
-        <p:nvPicPr>
-          <p:cNvPr id="50" name="Graphic 49">
-            <a:extLst>
-              <a:ext uri="{FF2B5EF4-FFF2-40B4-BE49-F238E27FC236}">
-                <a16:creationId xmlns:a16="http://schemas.microsoft.com/office/drawing/2014/main" id="{5EE21DAF-AE78-62EF-4C65-A0A923962BA4}"/>
-              </a:ext>
-            </a:extLst>
-          </p:cNvPr>
-          <p:cNvPicPr>
-            <a:picLocks noChangeAspect="1"/>
-          </p:cNvPicPr>
-          <p:nvPr/>
-        </p:nvPicPr>
-        <p:blipFill>
-          <a:blip r:embed="rId8">
-            <a:extLst>
-              <a:ext uri="{96DAC541-7B7A-43D3-8B79-37D633B846F1}">
-                <asvg:svgBlip xmlns:asvg="http://schemas.microsoft.com/office/drawing/2016/SVG/main" r:embed="rId9"/>
-              </a:ext>
-            </a:extLst>
-          </a:blip>
-          <a:stretch>
-            <a:fillRect/>
-          </a:stretch>
-        </p:blipFill>
-        <p:spPr>
-          <a:xfrm>
-            <a:off x="5323481" y="2288430"/>
-            <a:ext cx="3538580" cy="1930134"/>
-          </a:xfrm>
-          <a:prstGeom prst="rect">
-            <a:avLst/>
-          </a:prstGeom>
-        </p:spPr>
-      </p:pic>
-      <p:pic>
-        <p:nvPicPr>
-          <p:cNvPr id="69" name="Graphic 68">
-            <a:extLst>
-              <a:ext uri="{FF2B5EF4-FFF2-40B4-BE49-F238E27FC236}">
-                <a16:creationId xmlns:a16="http://schemas.microsoft.com/office/drawing/2014/main" id="{64BA2912-C600-1A32-B98E-6F814FDCBB67}"/>
-              </a:ext>
-            </a:extLst>
-          </p:cNvPr>
-          <p:cNvPicPr>
-            <a:picLocks noChangeAspect="1"/>
-          </p:cNvPicPr>
-          <p:nvPr/>
-        </p:nvPicPr>
-        <p:blipFill>
-          <a:blip r:embed="rId10">
-            <a:extLst>
-              <a:ext uri="{96DAC541-7B7A-43D3-8B79-37D633B846F1}">
-                <asvg:svgBlip xmlns:asvg="http://schemas.microsoft.com/office/drawing/2016/SVG/main" r:embed="rId11"/>
-              </a:ext>
-            </a:extLst>
-          </a:blip>
-          <a:stretch>
-            <a:fillRect/>
-          </a:stretch>
-        </p:blipFill>
-        <p:spPr>
-          <a:xfrm>
-            <a:off x="4874559" y="4121903"/>
-            <a:ext cx="4417973" cy="1893417"/>
-          </a:xfrm>
-          <a:prstGeom prst="rect">
-            <a:avLst/>
-          </a:prstGeom>
-        </p:spPr>
-      </p:pic>
-      <p:pic>
-        <p:nvPicPr>
-          <p:cNvPr id="73" name="Graphic 72">
-            <a:extLst>
-              <a:ext uri="{FF2B5EF4-FFF2-40B4-BE49-F238E27FC236}">
-                <a16:creationId xmlns:a16="http://schemas.microsoft.com/office/drawing/2014/main" id="{BE0D00BB-174A-3517-3564-60F5745427EB}"/>
-              </a:ext>
-            </a:extLst>
-          </p:cNvPr>
-          <p:cNvPicPr>
-            <a:picLocks noChangeAspect="1"/>
-          </p:cNvPicPr>
-          <p:nvPr/>
-        </p:nvPicPr>
-        <p:blipFill>
-          <a:blip r:embed="rId12">
-            <a:extLst>
-              <a:ext uri="{96DAC541-7B7A-43D3-8B79-37D633B846F1}">
-                <asvg:svgBlip xmlns:asvg="http://schemas.microsoft.com/office/drawing/2016/SVG/main" r:embed="rId13"/>
-              </a:ext>
-            </a:extLst>
-          </a:blip>
-          <a:stretch>
-            <a:fillRect/>
-          </a:stretch>
-        </p:blipFill>
-        <p:spPr>
-          <a:xfrm>
-            <a:off x="2411309" y="10821533"/>
-            <a:ext cx="2220452" cy="1480301"/>
-          </a:xfrm>
-          <a:prstGeom prst="rect">
-            <a:avLst/>
-          </a:prstGeom>
-        </p:spPr>
-      </p:pic>
-      <p:pic>
-        <p:nvPicPr>
-          <p:cNvPr id="75" name="Graphic 74">
-            <a:extLst>
-              <a:ext uri="{FF2B5EF4-FFF2-40B4-BE49-F238E27FC236}">
-                <a16:creationId xmlns:a16="http://schemas.microsoft.com/office/drawing/2014/main" id="{CC2539EB-54EE-6DC7-9A3B-5C076E943083}"/>
-              </a:ext>
-            </a:extLst>
-          </p:cNvPr>
-          <p:cNvPicPr>
-            <a:picLocks noChangeAspect="1"/>
-          </p:cNvPicPr>
-          <p:nvPr/>
-        </p:nvPicPr>
-        <p:blipFill>
-          <a:blip r:embed="rId14">
-            <a:extLst>
-              <a:ext uri="{96DAC541-7B7A-43D3-8B79-37D633B846F1}">
-                <asvg:svgBlip xmlns:asvg="http://schemas.microsoft.com/office/drawing/2016/SVG/main" r:embed="rId15"/>
-              </a:ext>
-            </a:extLst>
-          </a:blip>
-          <a:stretch>
-            <a:fillRect/>
-          </a:stretch>
-        </p:blipFill>
-        <p:spPr>
-          <a:xfrm>
-            <a:off x="98534" y="2338257"/>
-            <a:ext cx="2352000" cy="1764000"/>
-          </a:xfrm>
-          <a:prstGeom prst="rect">
-            <a:avLst/>
-          </a:prstGeom>
-        </p:spPr>
-      </p:pic>
-      <p:pic>
-        <p:nvPicPr>
-          <p:cNvPr id="79" name="Graphic 78">
-            <a:extLst>
-              <a:ext uri="{FF2B5EF4-FFF2-40B4-BE49-F238E27FC236}">
-                <a16:creationId xmlns:a16="http://schemas.microsoft.com/office/drawing/2014/main" id="{2ABE33E3-870B-77E2-0F40-2980EA84EB94}"/>
-              </a:ext>
-            </a:extLst>
-          </p:cNvPr>
-          <p:cNvPicPr>
-            <a:picLocks noChangeAspect="1"/>
-          </p:cNvPicPr>
-          <p:nvPr/>
-        </p:nvPicPr>
-        <p:blipFill>
-          <a:blip r:embed="rId16">
-            <a:extLst>
-              <a:ext uri="{96DAC541-7B7A-43D3-8B79-37D633B846F1}">
-                <asvg:svgBlip xmlns:asvg="http://schemas.microsoft.com/office/drawing/2016/SVG/main" r:embed="rId17"/>
-              </a:ext>
-            </a:extLst>
-          </a:blip>
-          <a:stretch>
-            <a:fillRect/>
-          </a:stretch>
-        </p:blipFill>
-        <p:spPr>
-          <a:xfrm>
-            <a:off x="98534" y="4228757"/>
-            <a:ext cx="2352000" cy="1764000"/>
-          </a:xfrm>
-          <a:prstGeom prst="rect">
-            <a:avLst/>
-          </a:prstGeom>
-        </p:spPr>
-      </p:pic>
-      <p:pic>
-        <p:nvPicPr>
-          <p:cNvPr id="81" name="Graphic 80">
-            <a:extLst>
-              <a:ext uri="{FF2B5EF4-FFF2-40B4-BE49-F238E27FC236}">
-                <a16:creationId xmlns:a16="http://schemas.microsoft.com/office/drawing/2014/main" id="{3D5DEA75-79F0-F202-2A31-EF90B73EE950}"/>
-              </a:ext>
-            </a:extLst>
-          </p:cNvPr>
-          <p:cNvPicPr>
-            <a:picLocks noChangeAspect="1"/>
-          </p:cNvPicPr>
-          <p:nvPr/>
-        </p:nvPicPr>
-        <p:blipFill>
-          <a:blip r:embed="rId18">
-            <a:extLst>
-              <a:ext uri="{96DAC541-7B7A-43D3-8B79-37D633B846F1}">
-                <asvg:svgBlip xmlns:asvg="http://schemas.microsoft.com/office/drawing/2016/SVG/main" r:embed="rId19"/>
-              </a:ext>
-            </a:extLst>
-          </a:blip>
-          <a:stretch>
-            <a:fillRect/>
-          </a:stretch>
-        </p:blipFill>
-        <p:spPr>
-          <a:xfrm>
-            <a:off x="2413524" y="4236471"/>
-            <a:ext cx="2352000" cy="1764000"/>
-          </a:xfrm>
-          <a:prstGeom prst="rect">
-            <a:avLst/>
-          </a:prstGeom>
-        </p:spPr>
-      </p:pic>
-      <p:pic>
-        <p:nvPicPr>
-          <p:cNvPr id="83" name="Graphic 82">
-            <a:extLst>
-              <a:ext uri="{FF2B5EF4-FFF2-40B4-BE49-F238E27FC236}">
-                <a16:creationId xmlns:a16="http://schemas.microsoft.com/office/drawing/2014/main" id="{96D2D6D0-F2A8-7060-962E-D0FBE1D57E87}"/>
-              </a:ext>
-            </a:extLst>
-          </p:cNvPr>
-          <p:cNvPicPr>
-            <a:picLocks noChangeAspect="1"/>
-          </p:cNvPicPr>
-          <p:nvPr/>
-        </p:nvPicPr>
-        <p:blipFill>
-          <a:blip r:embed="rId20">
-            <a:extLst>
-              <a:ext uri="{96DAC541-7B7A-43D3-8B79-37D633B846F1}">
-                <asvg:svgBlip xmlns:asvg="http://schemas.microsoft.com/office/drawing/2016/SVG/main" r:embed="rId21"/>
-              </a:ext>
-            </a:extLst>
-          </a:blip>
-          <a:stretch>
-            <a:fillRect/>
-          </a:stretch>
-        </p:blipFill>
-        <p:spPr>
-          <a:xfrm>
-            <a:off x="2413524" y="2338257"/>
-            <a:ext cx="2352000" cy="1764000"/>
-          </a:xfrm>
-          <a:prstGeom prst="rect">
-            <a:avLst/>
-          </a:prstGeom>
-        </p:spPr>
-      </p:pic>
-      <p:grpSp>
-        <p:nvGrpSpPr>
-          <p:cNvPr id="88" name="Group 87">
-            <a:extLst>
-              <a:ext uri="{FF2B5EF4-FFF2-40B4-BE49-F238E27FC236}">
-                <a16:creationId xmlns:a16="http://schemas.microsoft.com/office/drawing/2014/main" id="{1232026D-6EE0-DCDB-0032-80CE86233ED4}"/>
-              </a:ext>
-            </a:extLst>
-          </p:cNvPr>
-          <p:cNvGrpSpPr/>
-          <p:nvPr/>
-        </p:nvGrpSpPr>
-        <p:grpSpPr>
-          <a:xfrm>
-            <a:off x="244390" y="10849500"/>
-            <a:ext cx="1917269" cy="1205341"/>
-            <a:chOff x="952760" y="3036178"/>
-            <a:chExt cx="3319272" cy="1535109"/>
-          </a:xfrm>
-        </p:grpSpPr>
-        <p:sp>
-          <p:nvSpPr>
-            <p:cNvPr id="89" name="Rectangle: Rounded Corners 88">
-              <a:extLst>
-                <a:ext uri="{FF2B5EF4-FFF2-40B4-BE49-F238E27FC236}">
-                  <a16:creationId xmlns:a16="http://schemas.microsoft.com/office/drawing/2014/main" id="{43757A0A-44B7-0168-E651-9C087CE8ABB9}"/>
-                </a:ext>
-              </a:extLst>
-            </p:cNvPr>
-            <p:cNvSpPr/>
-            <p:nvPr/>
-          </p:nvSpPr>
-          <p:spPr>
-            <a:xfrm>
-              <a:off x="952760" y="3201263"/>
-              <a:ext cx="3319272" cy="1370024"/>
-            </a:xfrm>
-            <a:prstGeom prst="roundRect">
-              <a:avLst>
-                <a:gd name="adj" fmla="val 15145"/>
-              </a:avLst>
-            </a:prstGeom>
-            <a:noFill/>
-            <a:ln w="28575">
-              <a:solidFill>
-                <a:srgbClr val="CACCCC"/>
-              </a:solidFill>
-            </a:ln>
-          </p:spPr>
-          <p:style>
-            <a:lnRef idx="2">
-              <a:schemeClr val="accent1">
-                <a:shade val="50000"/>
-              </a:schemeClr>
-            </a:lnRef>
-            <a:fillRef idx="1">
-              <a:schemeClr val="accent1"/>
-            </a:fillRef>
-            <a:effectRef idx="0">
-              <a:schemeClr val="accent1"/>
-            </a:effectRef>
-            <a:fontRef idx="minor">
-              <a:schemeClr val="lt1"/>
-            </a:fontRef>
-          </p:style>
-          <p:txBody>
-            <a:bodyPr rtlCol="0" anchor="t"/>
-            <a:lstStyle>
-              <a:defPPr>
-                <a:defRPr lang="en-US"/>
-              </a:defPPr>
-              <a:lvl1pPr marL="0" algn="l" defTabSz="914400" rtl="0" eaLnBrk="1" latinLnBrk="0" hangingPunct="1">
-                <a:defRPr sz="1800" kern="1200">
-                  <a:solidFill>
-                    <a:schemeClr val="lt1"/>
-                  </a:solidFill>
-                  <a:latin typeface="+mn-lt"/>
-                  <a:ea typeface="+mn-ea"/>
-                  <a:cs typeface="+mn-cs"/>
-                </a:defRPr>
-              </a:lvl1pPr>
-              <a:lvl2pPr marL="457200" algn="l" defTabSz="914400" rtl="0" eaLnBrk="1" latinLnBrk="0" hangingPunct="1">
-                <a:defRPr sz="1800" kern="1200">
-                  <a:solidFill>
-                    <a:schemeClr val="lt1"/>
-                  </a:solidFill>
-                  <a:latin typeface="+mn-lt"/>
-                  <a:ea typeface="+mn-ea"/>
-                  <a:cs typeface="+mn-cs"/>
-                </a:defRPr>
-              </a:lvl2pPr>
-              <a:lvl3pPr marL="914400" algn="l" defTabSz="914400" rtl="0" eaLnBrk="1" latinLnBrk="0" hangingPunct="1">
-                <a:defRPr sz="1800" kern="1200">
-                  <a:solidFill>
-                    <a:schemeClr val="lt1"/>
-                  </a:solidFill>
-                  <a:latin typeface="+mn-lt"/>
-                  <a:ea typeface="+mn-ea"/>
-                  <a:cs typeface="+mn-cs"/>
-                </a:defRPr>
-              </a:lvl3pPr>
-              <a:lvl4pPr marL="1371600" algn="l" defTabSz="914400" rtl="0" eaLnBrk="1" latinLnBrk="0" hangingPunct="1">
-                <a:defRPr sz="1800" kern="1200">
-                  <a:solidFill>
-                    <a:schemeClr val="lt1"/>
-                  </a:solidFill>
-                  <a:latin typeface="+mn-lt"/>
-                  <a:ea typeface="+mn-ea"/>
-                  <a:cs typeface="+mn-cs"/>
-                </a:defRPr>
-              </a:lvl4pPr>
-              <a:lvl5pPr marL="1828800" algn="l" defTabSz="914400" rtl="0" eaLnBrk="1" latinLnBrk="0" hangingPunct="1">
-                <a:defRPr sz="1800" kern="1200">
-                  <a:solidFill>
-                    <a:schemeClr val="lt1"/>
-                  </a:solidFill>
-                  <a:latin typeface="+mn-lt"/>
-                  <a:ea typeface="+mn-ea"/>
-                  <a:cs typeface="+mn-cs"/>
-                </a:defRPr>
-              </a:lvl5pPr>
-              <a:lvl6pPr marL="2286000" algn="l" defTabSz="914400" rtl="0" eaLnBrk="1" latinLnBrk="0" hangingPunct="1">
-                <a:defRPr sz="1800" kern="1200">
-                  <a:solidFill>
-                    <a:schemeClr val="lt1"/>
-                  </a:solidFill>
-                  <a:latin typeface="+mn-lt"/>
-                  <a:ea typeface="+mn-ea"/>
-                  <a:cs typeface="+mn-cs"/>
-                </a:defRPr>
-              </a:lvl6pPr>
-              <a:lvl7pPr marL="2743200" algn="l" defTabSz="914400" rtl="0" eaLnBrk="1" latinLnBrk="0" hangingPunct="1">
-                <a:defRPr sz="1800" kern="1200">
-                  <a:solidFill>
-                    <a:schemeClr val="lt1"/>
-                  </a:solidFill>
-                  <a:latin typeface="+mn-lt"/>
-                  <a:ea typeface="+mn-ea"/>
-                  <a:cs typeface="+mn-cs"/>
-                </a:defRPr>
-              </a:lvl7pPr>
-              <a:lvl8pPr marL="3200400" algn="l" defTabSz="914400" rtl="0" eaLnBrk="1" latinLnBrk="0" hangingPunct="1">
-                <a:defRPr sz="1800" kern="1200">
-                  <a:solidFill>
-                    <a:schemeClr val="lt1"/>
-                  </a:solidFill>
-                  <a:latin typeface="+mn-lt"/>
-                  <a:ea typeface="+mn-ea"/>
-                  <a:cs typeface="+mn-cs"/>
-                </a:defRPr>
-              </a:lvl8pPr>
-              <a:lvl9pPr marL="3657600" algn="l" defTabSz="914400" rtl="0" eaLnBrk="1" latinLnBrk="0" hangingPunct="1">
-                <a:defRPr sz="1800" kern="1200">
-                  <a:solidFill>
-                    <a:schemeClr val="lt1"/>
-                  </a:solidFill>
-                  <a:latin typeface="+mn-lt"/>
-                  <a:ea typeface="+mn-ea"/>
-                  <a:cs typeface="+mn-cs"/>
-                </a:defRPr>
-              </a:lvl9pPr>
-            </a:lstStyle>
-            <a:p>
-              <a:pPr algn="ctr">
-                <a:defRPr/>
-              </a:pPr>
-              <a:endParaRPr lang="en-US" sz="300" noProof="1">
-                <a:solidFill>
-                  <a:prstClr val="black">
-                    <a:lumMod val="65000"/>
-                    <a:lumOff val="35000"/>
-                  </a:prstClr>
-                </a:solidFill>
-                <a:latin typeface="Calibri" panose="020F0502020204030204"/>
-              </a:endParaRPr>
-            </a:p>
-            <a:p>
-              <a:pPr algn="ctr">
-                <a:defRPr/>
-              </a:pPr>
-              <a:r>
-                <a:rPr lang="en-GB" sz="1400" dirty="0">
-                  <a:solidFill>
-                    <a:prstClr val="black">
-                      <a:lumMod val="65000"/>
-                      <a:lumOff val="35000"/>
-                    </a:prstClr>
-                  </a:solidFill>
-                  <a:latin typeface="Calibri" panose="020F0502020204030204"/>
-                </a:rPr>
-                <a:t>Three hub airports account for </a:t>
-              </a:r>
-              <a:r>
-                <a:rPr lang="en-GB" sz="1400" b="1" dirty="0">
-                  <a:solidFill>
-                    <a:prstClr val="black">
-                      <a:lumMod val="65000"/>
-                      <a:lumOff val="35000"/>
-                    </a:prstClr>
-                  </a:solidFill>
-                  <a:latin typeface="Calibri" panose="020F0502020204030204"/>
-                </a:rPr>
-                <a:t>nearly half of all flights </a:t>
-              </a:r>
-              <a:r>
-                <a:rPr lang="en-GB" sz="1400" dirty="0">
-                  <a:solidFill>
-                    <a:prstClr val="black">
-                      <a:lumMod val="65000"/>
-                      <a:lumOff val="35000"/>
-                    </a:prstClr>
-                  </a:solidFill>
-                  <a:latin typeface="Calibri" panose="020F0502020204030204"/>
-                </a:rPr>
-                <a:t>and lead national growth.</a:t>
-              </a:r>
-              <a:endParaRPr kumimoji="0" lang="en-US" sz="1400" b="0" i="0" u="none" strike="noStrike" kern="1200" cap="none" spc="0" normalizeH="0" baseline="0" noProof="1">
-                <a:ln>
-                  <a:noFill/>
-                </a:ln>
-                <a:solidFill>
-                  <a:prstClr val="black">
-                    <a:lumMod val="65000"/>
-                    <a:lumOff val="35000"/>
-                  </a:prstClr>
-                </a:solidFill>
-                <a:effectLst/>
-                <a:uLnTx/>
-                <a:uFillTx/>
-                <a:latin typeface="Calibri" panose="020F0502020204030204"/>
-                <a:ea typeface="+mn-ea"/>
-                <a:cs typeface="+mn-cs"/>
-              </a:endParaRPr>
-            </a:p>
-          </p:txBody>
-        </p:sp>
-        <p:sp>
-          <p:nvSpPr>
-            <p:cNvPr id="90" name="Freeform: Shape 89">
-              <a:extLst>
-                <a:ext uri="{FF2B5EF4-FFF2-40B4-BE49-F238E27FC236}">
-                  <a16:creationId xmlns:a16="http://schemas.microsoft.com/office/drawing/2014/main" id="{7EAE5F93-B1A2-9CD9-4735-B8BF4D662F29}"/>
-                </a:ext>
-              </a:extLst>
-            </p:cNvPr>
-            <p:cNvSpPr/>
-            <p:nvPr/>
-          </p:nvSpPr>
-          <p:spPr>
-            <a:xfrm>
-              <a:off x="1094949" y="3036178"/>
-              <a:ext cx="3046538" cy="331361"/>
-            </a:xfrm>
-            <a:custGeom>
-              <a:avLst/>
-              <a:gdLst>
-                <a:gd name="connsiteX0" fmla="*/ 351094 w 3046538"/>
-                <a:gd name="connsiteY0" fmla="*/ 0 h 331361"/>
-                <a:gd name="connsiteX1" fmla="*/ 2683799 w 3046538"/>
-                <a:gd name="connsiteY1" fmla="*/ 0 h 331361"/>
-                <a:gd name="connsiteX2" fmla="*/ 2743299 w 3046538"/>
-                <a:gd name="connsiteY2" fmla="*/ 12013 h 331361"/>
-                <a:gd name="connsiteX3" fmla="*/ 2743789 w 3046538"/>
-                <a:gd name="connsiteY3" fmla="*/ 12343 h 331361"/>
-                <a:gd name="connsiteX4" fmla="*/ 2747886 w 3046538"/>
-                <a:gd name="connsiteY4" fmla="*/ 13140 h 331361"/>
-                <a:gd name="connsiteX5" fmla="*/ 2802334 w 3046538"/>
-                <a:gd name="connsiteY5" fmla="*/ 49296 h 331361"/>
-                <a:gd name="connsiteX6" fmla="*/ 3046538 w 3046538"/>
-                <a:gd name="connsiteY6" fmla="*/ 165680 h 331361"/>
-                <a:gd name="connsiteX7" fmla="*/ 2802334 w 3046538"/>
-                <a:gd name="connsiteY7" fmla="*/ 282064 h 331361"/>
-                <a:gd name="connsiteX8" fmla="*/ 2747886 w 3046538"/>
-                <a:gd name="connsiteY8" fmla="*/ 318220 h 331361"/>
-                <a:gd name="connsiteX9" fmla="*/ 2743791 w 3046538"/>
-                <a:gd name="connsiteY9" fmla="*/ 319017 h 331361"/>
-                <a:gd name="connsiteX10" fmla="*/ 2743299 w 3046538"/>
-                <a:gd name="connsiteY10" fmla="*/ 319349 h 331361"/>
-                <a:gd name="connsiteX11" fmla="*/ 2683799 w 3046538"/>
-                <a:gd name="connsiteY11" fmla="*/ 331361 h 331361"/>
-                <a:gd name="connsiteX12" fmla="*/ 351094 w 3046538"/>
-                <a:gd name="connsiteY12" fmla="*/ 331361 h 331361"/>
-                <a:gd name="connsiteX13" fmla="*/ 243006 w 3046538"/>
-                <a:gd name="connsiteY13" fmla="*/ 286589 h 331361"/>
-                <a:gd name="connsiteX14" fmla="*/ 193128 w 3046538"/>
-                <a:gd name="connsiteY14" fmla="*/ 241208 h 331361"/>
-                <a:gd name="connsiteX15" fmla="*/ 0 w 3046538"/>
-                <a:gd name="connsiteY15" fmla="*/ 165680 h 331361"/>
-                <a:gd name="connsiteX16" fmla="*/ 193128 w 3046538"/>
-                <a:gd name="connsiteY16" fmla="*/ 90152 h 331361"/>
-                <a:gd name="connsiteX17" fmla="*/ 237522 w 3046538"/>
-                <a:gd name="connsiteY17" fmla="*/ 52906 h 331361"/>
-                <a:gd name="connsiteX18" fmla="*/ 243006 w 3046538"/>
-                <a:gd name="connsiteY18" fmla="*/ 44772 h 331361"/>
-                <a:gd name="connsiteX19" fmla="*/ 351094 w 3046538"/>
-                <a:gd name="connsiteY19" fmla="*/ 0 h 331361"/>
-                <a:gd name="connsiteX0" fmla="*/ 351094 w 3046538"/>
-                <a:gd name="connsiteY0" fmla="*/ 0 h 331361"/>
-                <a:gd name="connsiteX1" fmla="*/ 2683799 w 3046538"/>
-                <a:gd name="connsiteY1" fmla="*/ 0 h 331361"/>
-                <a:gd name="connsiteX2" fmla="*/ 2743299 w 3046538"/>
-                <a:gd name="connsiteY2" fmla="*/ 12013 h 331361"/>
-                <a:gd name="connsiteX3" fmla="*/ 2743789 w 3046538"/>
-                <a:gd name="connsiteY3" fmla="*/ 12343 h 331361"/>
-                <a:gd name="connsiteX4" fmla="*/ 2747886 w 3046538"/>
-                <a:gd name="connsiteY4" fmla="*/ 13140 h 331361"/>
-                <a:gd name="connsiteX5" fmla="*/ 2802334 w 3046538"/>
-                <a:gd name="connsiteY5" fmla="*/ 49296 h 331361"/>
-                <a:gd name="connsiteX6" fmla="*/ 3046538 w 3046538"/>
-                <a:gd name="connsiteY6" fmla="*/ 165680 h 331361"/>
-                <a:gd name="connsiteX7" fmla="*/ 2802334 w 3046538"/>
-                <a:gd name="connsiteY7" fmla="*/ 282064 h 331361"/>
-                <a:gd name="connsiteX8" fmla="*/ 2747886 w 3046538"/>
-                <a:gd name="connsiteY8" fmla="*/ 318220 h 331361"/>
-                <a:gd name="connsiteX9" fmla="*/ 2743791 w 3046538"/>
-                <a:gd name="connsiteY9" fmla="*/ 319017 h 331361"/>
-                <a:gd name="connsiteX10" fmla="*/ 2743299 w 3046538"/>
-                <a:gd name="connsiteY10" fmla="*/ 319349 h 331361"/>
-                <a:gd name="connsiteX11" fmla="*/ 2683799 w 3046538"/>
-                <a:gd name="connsiteY11" fmla="*/ 331361 h 331361"/>
-                <a:gd name="connsiteX12" fmla="*/ 351094 w 3046538"/>
-                <a:gd name="connsiteY12" fmla="*/ 331361 h 331361"/>
-                <a:gd name="connsiteX13" fmla="*/ 243006 w 3046538"/>
-                <a:gd name="connsiteY13" fmla="*/ 286589 h 331361"/>
-                <a:gd name="connsiteX14" fmla="*/ 193128 w 3046538"/>
-                <a:gd name="connsiteY14" fmla="*/ 241208 h 331361"/>
-                <a:gd name="connsiteX15" fmla="*/ 0 w 3046538"/>
-                <a:gd name="connsiteY15" fmla="*/ 165680 h 331361"/>
-                <a:gd name="connsiteX16" fmla="*/ 193128 w 3046538"/>
-                <a:gd name="connsiteY16" fmla="*/ 90152 h 331361"/>
-                <a:gd name="connsiteX17" fmla="*/ 243006 w 3046538"/>
-                <a:gd name="connsiteY17" fmla="*/ 44772 h 331361"/>
-                <a:gd name="connsiteX18" fmla="*/ 351094 w 3046538"/>
-                <a:gd name="connsiteY18" fmla="*/ 0 h 331361"/>
-              </a:gdLst>
-              <a:ahLst/>
-              <a:cxnLst>
-                <a:cxn ang="0">
-                  <a:pos x="connsiteX0" y="connsiteY0"/>
-                </a:cxn>
-                <a:cxn ang="0">
-                  <a:pos x="connsiteX1" y="connsiteY1"/>
-                </a:cxn>
-                <a:cxn ang="0">
-                  <a:pos x="connsiteX2" y="connsiteY2"/>
-                </a:cxn>
-                <a:cxn ang="0">
-                  <a:pos x="connsiteX3" y="connsiteY3"/>
-                </a:cxn>
-                <a:cxn ang="0">
-                  <a:pos x="connsiteX4" y="connsiteY4"/>
-                </a:cxn>
-                <a:cxn ang="0">
-                  <a:pos x="connsiteX5" y="connsiteY5"/>
-                </a:cxn>
-                <a:cxn ang="0">
-                  <a:pos x="connsiteX6" y="connsiteY6"/>
-                </a:cxn>
-                <a:cxn ang="0">
-                  <a:pos x="connsiteX7" y="connsiteY7"/>
-                </a:cxn>
-                <a:cxn ang="0">
-                  <a:pos x="connsiteX8" y="connsiteY8"/>
-                </a:cxn>
-                <a:cxn ang="0">
-                  <a:pos x="connsiteX9" y="connsiteY9"/>
-                </a:cxn>
-                <a:cxn ang="0">
-                  <a:pos x="connsiteX10" y="connsiteY10"/>
-                </a:cxn>
-                <a:cxn ang="0">
-                  <a:pos x="connsiteX11" y="connsiteY11"/>
-                </a:cxn>
-                <a:cxn ang="0">
-                  <a:pos x="connsiteX12" y="connsiteY12"/>
-                </a:cxn>
-                <a:cxn ang="0">
-                  <a:pos x="connsiteX13" y="connsiteY13"/>
-                </a:cxn>
-                <a:cxn ang="0">
-                  <a:pos x="connsiteX14" y="connsiteY14"/>
-                </a:cxn>
-                <a:cxn ang="0">
-                  <a:pos x="connsiteX15" y="connsiteY15"/>
-                </a:cxn>
-                <a:cxn ang="0">
-                  <a:pos x="connsiteX16" y="connsiteY16"/>
-                </a:cxn>
-                <a:cxn ang="0">
-                  <a:pos x="connsiteX17" y="connsiteY17"/>
-                </a:cxn>
-                <a:cxn ang="0">
-                  <a:pos x="connsiteX18" y="connsiteY18"/>
-                </a:cxn>
-              </a:cxnLst>
-              <a:rect l="l" t="t" r="r" b="b"/>
-              <a:pathLst>
-                <a:path w="3046538" h="331361">
-                  <a:moveTo>
-                    <a:pt x="351094" y="0"/>
-                  </a:moveTo>
-                  <a:lnTo>
-                    <a:pt x="2683799" y="0"/>
-                  </a:lnTo>
-                  <a:cubicBezTo>
-                    <a:pt x="2704905" y="0"/>
-                    <a:pt x="2725011" y="4278"/>
-                    <a:pt x="2743299" y="12013"/>
-                  </a:cubicBezTo>
-                  <a:lnTo>
-                    <a:pt x="2743789" y="12343"/>
-                  </a:lnTo>
-                  <a:lnTo>
-                    <a:pt x="2747886" y="13140"/>
-                  </a:lnTo>
-                  <a:cubicBezTo>
-                    <a:pt x="2767699" y="21175"/>
-                    <a:pt x="2786265" y="33227"/>
-                    <a:pt x="2802334" y="49296"/>
-                  </a:cubicBezTo>
-                  <a:cubicBezTo>
-                    <a:pt x="2862432" y="109394"/>
-                    <a:pt x="2943833" y="148189"/>
-                    <a:pt x="3046538" y="165680"/>
-                  </a:cubicBezTo>
-                  <a:cubicBezTo>
-                    <a:pt x="2943833" y="183171"/>
-                    <a:pt x="2862432" y="221967"/>
-                    <a:pt x="2802334" y="282064"/>
-                  </a:cubicBezTo>
-                  <a:cubicBezTo>
-                    <a:pt x="2786265" y="298133"/>
-                    <a:pt x="2767699" y="310186"/>
-                    <a:pt x="2747886" y="318220"/>
-                  </a:cubicBezTo>
-                  <a:lnTo>
-                    <a:pt x="2743791" y="319017"/>
-                  </a:lnTo>
-                  <a:lnTo>
-                    <a:pt x="2743299" y="319349"/>
-                  </a:lnTo>
-                  <a:cubicBezTo>
-                    <a:pt x="2725011" y="327084"/>
-                    <a:pt x="2704905" y="331361"/>
-                    <a:pt x="2683799" y="331361"/>
-                  </a:cubicBezTo>
-                  <a:lnTo>
-                    <a:pt x="351094" y="331361"/>
-                  </a:lnTo>
-                  <a:cubicBezTo>
-                    <a:pt x="308883" y="331361"/>
-                    <a:pt x="270668" y="314252"/>
-                    <a:pt x="243006" y="286589"/>
-                  </a:cubicBezTo>
-                  <a:lnTo>
-                    <a:pt x="193128" y="241208"/>
-                  </a:lnTo>
-                  <a:cubicBezTo>
-                    <a:pt x="140512" y="204273"/>
-                    <a:pt x="76137" y="179097"/>
-                    <a:pt x="0" y="165680"/>
-                  </a:cubicBezTo>
-                  <a:cubicBezTo>
-                    <a:pt x="76137" y="152264"/>
-                    <a:pt x="140512" y="127088"/>
-                    <a:pt x="193128" y="90152"/>
-                  </a:cubicBezTo>
-                  <a:lnTo>
-                    <a:pt x="243006" y="44772"/>
-                  </a:lnTo>
-                  <a:cubicBezTo>
-                    <a:pt x="270668" y="17110"/>
-                    <a:pt x="308883" y="0"/>
-                    <a:pt x="351094" y="0"/>
-                  </a:cubicBezTo>
-                  <a:close/>
-                </a:path>
-              </a:pathLst>
-            </a:custGeom>
-            <a:solidFill>
-              <a:srgbClr val="CACCCC"/>
-            </a:solidFill>
-            <a:ln>
-              <a:solidFill>
-                <a:srgbClr val="CACCCC"/>
-              </a:solidFill>
-            </a:ln>
-          </p:spPr>
-          <p:style>
-            <a:lnRef idx="2">
-              <a:schemeClr val="accent1">
-                <a:shade val="50000"/>
-              </a:schemeClr>
-            </a:lnRef>
-            <a:fillRef idx="1">
-              <a:schemeClr val="accent1"/>
-            </a:fillRef>
-            <a:effectRef idx="0">
-              <a:schemeClr val="accent1"/>
-            </a:effectRef>
-            <a:fontRef idx="minor">
-              <a:schemeClr val="lt1"/>
-            </a:fontRef>
-          </p:style>
-          <p:txBody>
-            <a:bodyPr wrap="square" rtlCol="0" anchor="ctr">
-              <a:noAutofit/>
-            </a:bodyPr>
-            <a:lstStyle>
-              <a:defPPr>
-                <a:defRPr lang="en-US"/>
-              </a:defPPr>
-              <a:lvl1pPr marL="0" algn="l" defTabSz="914400" rtl="0" eaLnBrk="1" latinLnBrk="0" hangingPunct="1">
-                <a:defRPr sz="1800" kern="1200">
-                  <a:solidFill>
-                    <a:schemeClr val="lt1"/>
-                  </a:solidFill>
-                  <a:latin typeface="+mn-lt"/>
-                  <a:ea typeface="+mn-ea"/>
-                  <a:cs typeface="+mn-cs"/>
-                </a:defRPr>
-              </a:lvl1pPr>
-              <a:lvl2pPr marL="457200" algn="l" defTabSz="914400" rtl="0" eaLnBrk="1" latinLnBrk="0" hangingPunct="1">
-                <a:defRPr sz="1800" kern="1200">
-                  <a:solidFill>
-                    <a:schemeClr val="lt1"/>
-                  </a:solidFill>
-                  <a:latin typeface="+mn-lt"/>
-                  <a:ea typeface="+mn-ea"/>
-                  <a:cs typeface="+mn-cs"/>
-                </a:defRPr>
-              </a:lvl2pPr>
-              <a:lvl3pPr marL="914400" algn="l" defTabSz="914400" rtl="0" eaLnBrk="1" latinLnBrk="0" hangingPunct="1">
-                <a:defRPr sz="1800" kern="1200">
-                  <a:solidFill>
-                    <a:schemeClr val="lt1"/>
-                  </a:solidFill>
-                  <a:latin typeface="+mn-lt"/>
-                  <a:ea typeface="+mn-ea"/>
-                  <a:cs typeface="+mn-cs"/>
-                </a:defRPr>
-              </a:lvl3pPr>
-              <a:lvl4pPr marL="1371600" algn="l" defTabSz="914400" rtl="0" eaLnBrk="1" latinLnBrk="0" hangingPunct="1">
-                <a:defRPr sz="1800" kern="1200">
-                  <a:solidFill>
-                    <a:schemeClr val="lt1"/>
-                  </a:solidFill>
-                  <a:latin typeface="+mn-lt"/>
-                  <a:ea typeface="+mn-ea"/>
-                  <a:cs typeface="+mn-cs"/>
-                </a:defRPr>
-              </a:lvl4pPr>
-              <a:lvl5pPr marL="1828800" algn="l" defTabSz="914400" rtl="0" eaLnBrk="1" latinLnBrk="0" hangingPunct="1">
-                <a:defRPr sz="1800" kern="1200">
-                  <a:solidFill>
-                    <a:schemeClr val="lt1"/>
-                  </a:solidFill>
-                  <a:latin typeface="+mn-lt"/>
-                  <a:ea typeface="+mn-ea"/>
-                  <a:cs typeface="+mn-cs"/>
-                </a:defRPr>
-              </a:lvl5pPr>
-              <a:lvl6pPr marL="2286000" algn="l" defTabSz="914400" rtl="0" eaLnBrk="1" latinLnBrk="0" hangingPunct="1">
-                <a:defRPr sz="1800" kern="1200">
-                  <a:solidFill>
-                    <a:schemeClr val="lt1"/>
-                  </a:solidFill>
-                  <a:latin typeface="+mn-lt"/>
-                  <a:ea typeface="+mn-ea"/>
-                  <a:cs typeface="+mn-cs"/>
-                </a:defRPr>
-              </a:lvl6pPr>
-              <a:lvl7pPr marL="2743200" algn="l" defTabSz="914400" rtl="0" eaLnBrk="1" latinLnBrk="0" hangingPunct="1">
-                <a:defRPr sz="1800" kern="1200">
-                  <a:solidFill>
-                    <a:schemeClr val="lt1"/>
-                  </a:solidFill>
-                  <a:latin typeface="+mn-lt"/>
-                  <a:ea typeface="+mn-ea"/>
-                  <a:cs typeface="+mn-cs"/>
-                </a:defRPr>
-              </a:lvl7pPr>
-              <a:lvl8pPr marL="3200400" algn="l" defTabSz="914400" rtl="0" eaLnBrk="1" latinLnBrk="0" hangingPunct="1">
-                <a:defRPr sz="1800" kern="1200">
-                  <a:solidFill>
-                    <a:schemeClr val="lt1"/>
-                  </a:solidFill>
-                  <a:latin typeface="+mn-lt"/>
-                  <a:ea typeface="+mn-ea"/>
-                  <a:cs typeface="+mn-cs"/>
-                </a:defRPr>
-              </a:lvl8pPr>
-              <a:lvl9pPr marL="3657600" algn="l" defTabSz="914400" rtl="0" eaLnBrk="1" latinLnBrk="0" hangingPunct="1">
-                <a:defRPr sz="1800" kern="1200">
-                  <a:solidFill>
-                    <a:schemeClr val="lt1"/>
-                  </a:solidFill>
-                  <a:latin typeface="+mn-lt"/>
-                  <a:ea typeface="+mn-ea"/>
-                  <a:cs typeface="+mn-cs"/>
-                </a:defRPr>
-              </a:lvl9pPr>
-            </a:lstStyle>
-            <a:p>
-              <a:pPr algn="ctr"/>
-              <a:r>
-                <a:rPr lang="en-US" sz="1600" b="1" dirty="0">
-                  <a:solidFill>
-                    <a:schemeClr val="tx1"/>
-                  </a:solidFill>
-                </a:rPr>
-                <a:t>Mega Hubs</a:t>
-              </a:r>
-            </a:p>
-          </p:txBody>
-        </p:sp>
-      </p:grpSp>
-      <p:cxnSp>
-        <p:nvCxnSpPr>
-          <p:cNvPr id="3" name="Straight Connector 2">
-            <a:extLst>
-              <a:ext uri="{FF2B5EF4-FFF2-40B4-BE49-F238E27FC236}">
-                <a16:creationId xmlns:a16="http://schemas.microsoft.com/office/drawing/2014/main" id="{CF5E49CA-1EF0-96A6-E0FC-54E9D9C97F88}"/>
-              </a:ext>
-            </a:extLst>
-          </p:cNvPr>
-          <p:cNvCxnSpPr>
-            <a:cxnSpLocks/>
-          </p:cNvCxnSpPr>
-          <p:nvPr/>
-        </p:nvCxnSpPr>
-        <p:spPr>
-          <a:xfrm>
-            <a:off x="0" y="2190843"/>
-            <a:ext cx="4726641" cy="0"/>
-          </a:xfrm>
-          <a:prstGeom prst="line">
-            <a:avLst/>
-          </a:prstGeom>
-          <a:ln w="28575">
-            <a:solidFill>
-              <a:srgbClr val="001D43"/>
-            </a:solidFill>
-          </a:ln>
-        </p:spPr>
-        <p:style>
-          <a:lnRef idx="2">
-            <a:schemeClr val="accent1"/>
-          </a:lnRef>
-          <a:fillRef idx="0">
-            <a:schemeClr val="accent1"/>
-          </a:fillRef>
-          <a:effectRef idx="1">
-            <a:schemeClr val="accent1"/>
-          </a:effectRef>
-          <a:fontRef idx="minor">
-            <a:schemeClr val="tx1"/>
-          </a:fontRef>
-        </p:style>
-      </p:cxnSp>
-      <p:sp>
-        <p:nvSpPr>
-          <p:cNvPr id="6" name="TextBox 5">
-            <a:extLst>
-              <a:ext uri="{FF2B5EF4-FFF2-40B4-BE49-F238E27FC236}">
-                <a16:creationId xmlns:a16="http://schemas.microsoft.com/office/drawing/2014/main" id="{9ABBBA83-23DB-F755-3AB0-4F9D4724C5F4}"/>
-              </a:ext>
-            </a:extLst>
-          </p:cNvPr>
-          <p:cNvSpPr txBox="1"/>
-          <p:nvPr/>
-        </p:nvSpPr>
-        <p:spPr>
-          <a:xfrm>
-            <a:off x="-8164" y="1497562"/>
-            <a:ext cx="4822824" cy="646331"/>
-          </a:xfrm>
-          <a:prstGeom prst="rect">
-            <a:avLst/>
-          </a:prstGeom>
-          <a:noFill/>
-        </p:spPr>
-        <p:txBody>
-          <a:bodyPr wrap="square">
-            <a:spAutoFit/>
-          </a:bodyPr>
-          <a:lstStyle/>
-          <a:p>
-            <a:r>
-              <a:rPr lang="en-GB" sz="1800" b="1" dirty="0"/>
-              <a:t>Current Customer Segmentation doesn’t separate for Travel habits or Income</a:t>
-            </a:r>
-            <a:endParaRPr lang="en-AT" sz="1800" b="1" dirty="0"/>
-          </a:p>
-        </p:txBody>
-      </p:sp>
-      <p:sp>
-        <p:nvSpPr>
-          <p:cNvPr id="8" name="TextBox 7">
-            <a:extLst>
-              <a:ext uri="{FF2B5EF4-FFF2-40B4-BE49-F238E27FC236}">
-                <a16:creationId xmlns:a16="http://schemas.microsoft.com/office/drawing/2014/main" id="{66A72EB9-57FF-10DE-EEC1-FF1154511B93}"/>
-              </a:ext>
-            </a:extLst>
-          </p:cNvPr>
-          <p:cNvSpPr txBox="1"/>
-          <p:nvPr/>
-        </p:nvSpPr>
-        <p:spPr>
-          <a:xfrm>
-            <a:off x="4829628" y="1497562"/>
-            <a:ext cx="4982437" cy="646331"/>
-          </a:xfrm>
-          <a:prstGeom prst="rect">
-            <a:avLst/>
-          </a:prstGeom>
-          <a:noFill/>
-        </p:spPr>
-        <p:txBody>
-          <a:bodyPr wrap="square">
-            <a:spAutoFit/>
-          </a:bodyPr>
-          <a:lstStyle/>
-          <a:p>
-            <a:r>
-              <a:rPr lang="en-GB" sz="1800" b="1" dirty="0"/>
-              <a:t>Loyalty program growth is constant, but Customer lifetime Value growth is stagnating</a:t>
-            </a:r>
-            <a:endParaRPr lang="en-AT" sz="1800" b="1" dirty="0"/>
-          </a:p>
-        </p:txBody>
-      </p:sp>
-      <p:cxnSp>
-        <p:nvCxnSpPr>
-          <p:cNvPr id="9" name="Straight Connector 8">
-            <a:extLst>
-              <a:ext uri="{FF2B5EF4-FFF2-40B4-BE49-F238E27FC236}">
-                <a16:creationId xmlns:a16="http://schemas.microsoft.com/office/drawing/2014/main" id="{155972F2-971B-FFFB-B1D0-E83B49F80BC2}"/>
-              </a:ext>
-            </a:extLst>
-          </p:cNvPr>
-          <p:cNvCxnSpPr>
-            <a:cxnSpLocks/>
-          </p:cNvCxnSpPr>
-          <p:nvPr/>
-        </p:nvCxnSpPr>
-        <p:spPr>
-          <a:xfrm>
-            <a:off x="4874558" y="2190843"/>
-            <a:ext cx="4726641" cy="0"/>
-          </a:xfrm>
-          <a:prstGeom prst="line">
-            <a:avLst/>
-          </a:prstGeom>
-          <a:ln w="28575">
-            <a:solidFill>
-              <a:srgbClr val="001D43"/>
-            </a:solidFill>
-          </a:ln>
-        </p:spPr>
-        <p:style>
-          <a:lnRef idx="2">
-            <a:schemeClr val="accent1"/>
-          </a:lnRef>
-          <a:fillRef idx="0">
-            <a:schemeClr val="accent1"/>
-          </a:fillRef>
-          <a:effectRef idx="1">
-            <a:schemeClr val="accent1"/>
-          </a:effectRef>
-          <a:fontRef idx="minor">
-            <a:schemeClr val="tx1"/>
-          </a:fontRef>
-        </p:style>
-      </p:cxnSp>
-      <p:sp>
-        <p:nvSpPr>
-          <p:cNvPr id="13" name="TextBox 12">
-            <a:extLst>
-              <a:ext uri="{FF2B5EF4-FFF2-40B4-BE49-F238E27FC236}">
-                <a16:creationId xmlns:a16="http://schemas.microsoft.com/office/drawing/2014/main" id="{0FD2D4BD-735B-D605-9112-BB1180CF4EAE}"/>
-              </a:ext>
-            </a:extLst>
-          </p:cNvPr>
-          <p:cNvSpPr txBox="1"/>
-          <p:nvPr/>
-        </p:nvSpPr>
-        <p:spPr>
-          <a:xfrm>
-            <a:off x="-8164" y="7672636"/>
-            <a:ext cx="4895850" cy="646331"/>
-          </a:xfrm>
-          <a:prstGeom prst="rect">
-            <a:avLst/>
-          </a:prstGeom>
-          <a:noFill/>
-        </p:spPr>
-        <p:txBody>
-          <a:bodyPr wrap="square">
-            <a:spAutoFit/>
-          </a:bodyPr>
-          <a:lstStyle/>
-          <a:p>
-            <a:r>
-              <a:rPr lang="en-GB" sz="1800" b="1" dirty="0"/>
-              <a:t>Three Cities make up 47% of customers Travels</a:t>
-            </a:r>
-            <a:endParaRPr lang="en-AT" sz="1800" b="1" dirty="0"/>
-          </a:p>
-        </p:txBody>
-      </p:sp>
-      <p:cxnSp>
-        <p:nvCxnSpPr>
-          <p:cNvPr id="14" name="Straight Connector 13">
-            <a:extLst>
-              <a:ext uri="{FF2B5EF4-FFF2-40B4-BE49-F238E27FC236}">
-                <a16:creationId xmlns:a16="http://schemas.microsoft.com/office/drawing/2014/main" id="{DC8DF005-9CDD-2FC4-2008-9222239AC264}"/>
-              </a:ext>
-            </a:extLst>
-          </p:cNvPr>
-          <p:cNvCxnSpPr>
-            <a:cxnSpLocks/>
-          </p:cNvCxnSpPr>
-          <p:nvPr/>
-        </p:nvCxnSpPr>
-        <p:spPr>
-          <a:xfrm>
-            <a:off x="-10893" y="8290751"/>
-            <a:ext cx="4726641" cy="0"/>
-          </a:xfrm>
-          <a:prstGeom prst="line">
-            <a:avLst/>
-          </a:prstGeom>
-          <a:ln w="28575">
-            <a:solidFill>
-              <a:srgbClr val="001D43"/>
-            </a:solidFill>
-          </a:ln>
-        </p:spPr>
-        <p:style>
-          <a:lnRef idx="2">
-            <a:schemeClr val="accent1"/>
-          </a:lnRef>
-          <a:fillRef idx="0">
-            <a:schemeClr val="accent1"/>
-          </a:fillRef>
-          <a:effectRef idx="1">
-            <a:schemeClr val="accent1"/>
-          </a:effectRef>
-          <a:fontRef idx="minor">
-            <a:schemeClr val="tx1"/>
-          </a:fontRef>
-        </p:style>
-      </p:cxnSp>
-      <p:cxnSp>
-        <p:nvCxnSpPr>
-          <p:cNvPr id="15" name="Straight Connector 14">
-            <a:extLst>
-              <a:ext uri="{FF2B5EF4-FFF2-40B4-BE49-F238E27FC236}">
-                <a16:creationId xmlns:a16="http://schemas.microsoft.com/office/drawing/2014/main" id="{19ABE713-C8CB-B357-31CD-30507572E7FE}"/>
-              </a:ext>
-            </a:extLst>
-          </p:cNvPr>
-          <p:cNvCxnSpPr>
-            <a:cxnSpLocks/>
-          </p:cNvCxnSpPr>
-          <p:nvPr/>
-        </p:nvCxnSpPr>
-        <p:spPr>
-          <a:xfrm>
-            <a:off x="4874557" y="8288678"/>
-            <a:ext cx="4726641" cy="0"/>
-          </a:xfrm>
-          <a:prstGeom prst="line">
-            <a:avLst/>
-          </a:prstGeom>
-          <a:ln w="28575">
-            <a:solidFill>
-              <a:srgbClr val="001D43"/>
-            </a:solidFill>
-          </a:ln>
-        </p:spPr>
-        <p:style>
-          <a:lnRef idx="2">
-            <a:schemeClr val="accent1"/>
-          </a:lnRef>
-          <a:fillRef idx="0">
-            <a:schemeClr val="accent1"/>
-          </a:fillRef>
-          <a:effectRef idx="1">
-            <a:schemeClr val="accent1"/>
-          </a:effectRef>
-          <a:fontRef idx="minor">
-            <a:schemeClr val="tx1"/>
-          </a:fontRef>
-        </p:style>
-      </p:cxnSp>
-      <p:sp>
-        <p:nvSpPr>
-          <p:cNvPr id="18" name="TextBox 17">
-            <a:extLst>
-              <a:ext uri="{FF2B5EF4-FFF2-40B4-BE49-F238E27FC236}">
-                <a16:creationId xmlns:a16="http://schemas.microsoft.com/office/drawing/2014/main" id="{9D7A10C3-0F43-9260-54E6-CA311556DB9B}"/>
-              </a:ext>
-            </a:extLst>
-          </p:cNvPr>
-          <p:cNvSpPr txBox="1"/>
-          <p:nvPr/>
-        </p:nvSpPr>
-        <p:spPr>
-          <a:xfrm>
-            <a:off x="4829628" y="7640282"/>
-            <a:ext cx="4726643" cy="646331"/>
-          </a:xfrm>
-          <a:prstGeom prst="rect">
-            <a:avLst/>
-          </a:prstGeom>
-          <a:noFill/>
-        </p:spPr>
-        <p:txBody>
-          <a:bodyPr wrap="square">
-            <a:spAutoFit/>
-          </a:bodyPr>
-          <a:lstStyle/>
-          <a:p>
-            <a:pPr marL="0" rtl="0" eaLnBrk="1" latinLnBrk="0" hangingPunct="1">
-              <a:buNone/>
-            </a:pPr>
-            <a:r>
-              <a:rPr lang="en-GB" sz="1800" b="1" kern="1200" dirty="0">
-                <a:effectLst/>
-                <a:latin typeface="Aptos" panose="020B0004020202020204" pitchFamily="34" charset="0"/>
-                <a:ea typeface="+mn-ea"/>
-                <a:cs typeface="+mn-cs"/>
-              </a:rPr>
-              <a:t>Further clustering approaches should be </a:t>
-            </a:r>
-            <a:r>
-              <a:rPr lang="en-GB" b="1" dirty="0"/>
-              <a:t>based</a:t>
-            </a:r>
-            <a:r>
-              <a:rPr lang="en-GB" sz="1800" b="1" kern="1200" dirty="0">
-                <a:effectLst/>
-                <a:latin typeface="Aptos" panose="020B0004020202020204" pitchFamily="34" charset="0"/>
-                <a:ea typeface="+mn-ea"/>
-                <a:cs typeface="+mn-cs"/>
-              </a:rPr>
-              <a:t> on behavioural and profit metrices</a:t>
-            </a:r>
-            <a:endParaRPr lang="en-AT" dirty="0">
-              <a:effectLst/>
-            </a:endParaRPr>
-          </a:p>
-        </p:txBody>
-      </p:sp>
-      <p:sp>
-        <p:nvSpPr>
-          <p:cNvPr id="2" name="TextBox 1">
-            <a:extLst>
-              <a:ext uri="{FF2B5EF4-FFF2-40B4-BE49-F238E27FC236}">
-                <a16:creationId xmlns:a16="http://schemas.microsoft.com/office/drawing/2014/main" id="{CD9FC181-1926-F243-E3C2-34552C56520B}"/>
-              </a:ext>
-            </a:extLst>
-          </p:cNvPr>
-          <p:cNvSpPr txBox="1"/>
-          <p:nvPr/>
-        </p:nvSpPr>
-        <p:spPr>
-          <a:xfrm>
-            <a:off x="2487930" y="1009650"/>
-            <a:ext cx="4625340" cy="307777"/>
-          </a:xfrm>
-          <a:prstGeom prst="rect">
-            <a:avLst/>
-          </a:prstGeom>
-          <a:noFill/>
-        </p:spPr>
-        <p:txBody>
-          <a:bodyPr wrap="square" rtlCol="0">
-            <a:spAutoFit/>
-          </a:bodyPr>
-          <a:lstStyle/>
-          <a:p>
-            <a:r>
-              <a:rPr lang="en-GB" sz="1400" dirty="0">
-                <a:solidFill>
-                  <a:srgbClr val="444444"/>
-                </a:solidFill>
-              </a:rPr>
-              <a:t>Moritz Baldauf, Libero Biagi, Jenny Cubelo, Marcell Hajdú</a:t>
-            </a:r>
-            <a:endParaRPr lang="en-AT" sz="1400" dirty="0">
-              <a:solidFill>
-                <a:srgbClr val="444444"/>
-              </a:solidFill>
-            </a:endParaRPr>
-          </a:p>
-        </p:txBody>
-      </p:sp>
-    </p:spTree>
-    <p:extLst>
-      <p:ext uri="{BB962C8B-B14F-4D97-AF65-F5344CB8AC3E}">
-        <p14:creationId xmlns:p14="http://schemas.microsoft.com/office/powerpoint/2010/main" val="2213968062"/>
       </p:ext>
     </p:extLst>
   </p:cSld>

</xml_diff>